<commit_message>
acrescentando informacoes no curso de git
</commit_message>
<xml_diff>
--- a/Tutorial_GIT.pptx
+++ b/Tutorial_GIT.pptx
@@ -16,13 +16,14 @@
     <p:sldId id="268" r:id="rId10"/>
     <p:sldId id="269" r:id="rId11"/>
     <p:sldId id="270" r:id="rId12"/>
-    <p:sldId id="271" r:id="rId13"/>
-    <p:sldId id="272" r:id="rId14"/>
-    <p:sldId id="273" r:id="rId15"/>
-    <p:sldId id="274" r:id="rId16"/>
-    <p:sldId id="275" r:id="rId17"/>
-    <p:sldId id="276" r:id="rId18"/>
-    <p:sldId id="277" r:id="rId19"/>
+    <p:sldId id="283" r:id="rId13"/>
+    <p:sldId id="271" r:id="rId14"/>
+    <p:sldId id="272" r:id="rId15"/>
+    <p:sldId id="273" r:id="rId16"/>
+    <p:sldId id="274" r:id="rId17"/>
+    <p:sldId id="275" r:id="rId18"/>
+    <p:sldId id="276" r:id="rId19"/>
+    <p:sldId id="277" r:id="rId20"/>
   </p:sldIdLst>
   <p:sldSz cx="12192000" cy="6858000"/>
   <p:notesSz cx="6858000" cy="9144000"/>
@@ -121,6 +122,11 @@
       </a:defRPr>
     </a:lvl9pPr>
   </p:defaultTextStyle>
+  <p:extLst>
+    <p:ext uri="{EFAFB233-063F-42B5-8137-9DF3F51BA10A}">
+      <p15:sldGuideLst xmlns:p15="http://schemas.microsoft.com/office/powerpoint/2012/main"/>
+    </p:ext>
+  </p:extLst>
 </p:presentation>
 </file>
 
@@ -181,7 +187,7 @@
           <a:noFill/>
           <a:extLst>
             <a:ext uri="{909E8E84-426E-40dd-AFC4-6F175D3DCCD1}">
-              <a14:hiddenFill xmlns:a14="http://schemas.microsoft.com/office/drawing/2010/main" xmlns="">
+              <a14:hiddenFill xmlns="" xmlns:a14="http://schemas.microsoft.com/office/drawing/2010/main">
                 <a:solidFill>
                   <a:srgbClr val="FFFFFF"/>
                 </a:solidFill>
@@ -240,7 +246,7 @@
             </a:ln>
             <a:extLst>
               <a:ext uri="{91240B29-F687-4f45-9708-019B960494DF}">
-                <a14:hiddenLine xmlns:a14="http://schemas.microsoft.com/office/drawing/2010/main" xmlns="" w="9525">
+                <a14:hiddenLine xmlns="" xmlns:a14="http://schemas.microsoft.com/office/drawing/2010/main" w="9525">
                   <a:solidFill>
                     <a:srgbClr val="000000"/>
                   </a:solidFill>
@@ -330,7 +336,7 @@
             </a:ln>
             <a:extLst>
               <a:ext uri="{91240B29-F687-4f45-9708-019B960494DF}">
-                <a14:hiddenLine xmlns:a14="http://schemas.microsoft.com/office/drawing/2010/main" xmlns="" w="9525">
+                <a14:hiddenLine xmlns="" xmlns:a14="http://schemas.microsoft.com/office/drawing/2010/main" w="9525">
                   <a:solidFill>
                     <a:srgbClr val="000000"/>
                   </a:solidFill>
@@ -420,7 +426,7 @@
             </a:ln>
             <a:extLst>
               <a:ext uri="{91240B29-F687-4f45-9708-019B960494DF}">
-                <a14:hiddenLine xmlns:a14="http://schemas.microsoft.com/office/drawing/2010/main" xmlns="" w="9525">
+                <a14:hiddenLine xmlns="" xmlns:a14="http://schemas.microsoft.com/office/drawing/2010/main" w="9525">
                   <a:solidFill>
                     <a:srgbClr val="000000"/>
                   </a:solidFill>
@@ -454,7 +460,7 @@
             </a:ln>
             <a:extLst>
               <a:ext uri="{91240B29-F687-4f45-9708-019B960494DF}">
-                <a14:hiddenLine xmlns:a14="http://schemas.microsoft.com/office/drawing/2010/main" xmlns="" w="9525">
+                <a14:hiddenLine xmlns="" xmlns:a14="http://schemas.microsoft.com/office/drawing/2010/main" w="9525">
                   <a:solidFill>
                     <a:srgbClr val="000000"/>
                   </a:solidFill>
@@ -544,7 +550,7 @@
             </a:ln>
             <a:extLst>
               <a:ext uri="{91240B29-F687-4f45-9708-019B960494DF}">
-                <a14:hiddenLine xmlns:a14="http://schemas.microsoft.com/office/drawing/2010/main" xmlns="" w="9525">
+                <a14:hiddenLine xmlns="" xmlns:a14="http://schemas.microsoft.com/office/drawing/2010/main" w="9525">
                   <a:solidFill>
                     <a:srgbClr val="000000"/>
                   </a:solidFill>
@@ -606,7 +612,7 @@
             </a:ln>
             <a:extLst>
               <a:ext uri="{91240B29-F687-4f45-9708-019B960494DF}">
-                <a14:hiddenLine xmlns:a14="http://schemas.microsoft.com/office/drawing/2010/main" xmlns="" w="9525">
+                <a14:hiddenLine xmlns="" xmlns:a14="http://schemas.microsoft.com/office/drawing/2010/main" w="9525">
                   <a:solidFill>
                     <a:srgbClr val="000000"/>
                   </a:solidFill>
@@ -668,7 +674,7 @@
             </a:ln>
             <a:extLst>
               <a:ext uri="{91240B29-F687-4f45-9708-019B960494DF}">
-                <a14:hiddenLine xmlns:a14="http://schemas.microsoft.com/office/drawing/2010/main" xmlns="" w="9525">
+                <a14:hiddenLine xmlns="" xmlns:a14="http://schemas.microsoft.com/office/drawing/2010/main" w="9525">
                   <a:solidFill>
                     <a:srgbClr val="000000"/>
                   </a:solidFill>
@@ -758,7 +764,7 @@
             </a:ln>
             <a:extLst>
               <a:ext uri="{91240B29-F687-4f45-9708-019B960494DF}">
-                <a14:hiddenLine xmlns:a14="http://schemas.microsoft.com/office/drawing/2010/main" xmlns="" w="9525">
+                <a14:hiddenLine xmlns="" xmlns:a14="http://schemas.microsoft.com/office/drawing/2010/main" w="9525">
                   <a:solidFill>
                     <a:srgbClr val="000000"/>
                   </a:solidFill>
@@ -820,7 +826,7 @@
             </a:ln>
             <a:extLst>
               <a:ext uri="{91240B29-F687-4f45-9708-019B960494DF}">
-                <a14:hiddenLine xmlns:a14="http://schemas.microsoft.com/office/drawing/2010/main" xmlns="" w="9525">
+                <a14:hiddenLine xmlns="" xmlns:a14="http://schemas.microsoft.com/office/drawing/2010/main" w="9525">
                   <a:solidFill>
                     <a:srgbClr val="000000"/>
                   </a:solidFill>
@@ -882,7 +888,7 @@
             </a:ln>
             <a:extLst>
               <a:ext uri="{91240B29-F687-4f45-9708-019B960494DF}">
-                <a14:hiddenLine xmlns:a14="http://schemas.microsoft.com/office/drawing/2010/main" xmlns="" w="9525">
+                <a14:hiddenLine xmlns="" xmlns:a14="http://schemas.microsoft.com/office/drawing/2010/main" w="9525">
                   <a:solidFill>
                     <a:srgbClr val="000000"/>
                   </a:solidFill>
@@ -972,7 +978,7 @@
             </a:ln>
             <a:extLst>
               <a:ext uri="{91240B29-F687-4f45-9708-019B960494DF}">
-                <a14:hiddenLine xmlns:a14="http://schemas.microsoft.com/office/drawing/2010/main" xmlns="" w="9525">
+                <a14:hiddenLine xmlns="" xmlns:a14="http://schemas.microsoft.com/office/drawing/2010/main" w="9525">
                   <a:solidFill>
                     <a:srgbClr val="000000"/>
                   </a:solidFill>
@@ -1062,7 +1068,7 @@
             </a:ln>
             <a:extLst>
               <a:ext uri="{91240B29-F687-4f45-9708-019B960494DF}">
-                <a14:hiddenLine xmlns:a14="http://schemas.microsoft.com/office/drawing/2010/main" xmlns="" w="9525">
+                <a14:hiddenLine xmlns="" xmlns:a14="http://schemas.microsoft.com/office/drawing/2010/main" w="9525">
                   <a:solidFill>
                     <a:srgbClr val="000000"/>
                   </a:solidFill>
@@ -1124,7 +1130,7 @@
             </a:ln>
             <a:extLst>
               <a:ext uri="{91240B29-F687-4f45-9708-019B960494DF}">
-                <a14:hiddenLine xmlns:a14="http://schemas.microsoft.com/office/drawing/2010/main" xmlns="" w="9525">
+                <a14:hiddenLine xmlns="" xmlns:a14="http://schemas.microsoft.com/office/drawing/2010/main" w="9525">
                   <a:solidFill>
                     <a:srgbClr val="000000"/>
                   </a:solidFill>
@@ -1234,7 +1240,7 @@
             </a:ln>
             <a:extLst>
               <a:ext uri="{91240B29-F687-4f45-9708-019B960494DF}">
-                <a14:hiddenLine xmlns:a14="http://schemas.microsoft.com/office/drawing/2010/main" xmlns="" w="9525">
+                <a14:hiddenLine xmlns="" xmlns:a14="http://schemas.microsoft.com/office/drawing/2010/main" w="9525">
                   <a:solidFill>
                     <a:srgbClr val="000000"/>
                   </a:solidFill>
@@ -1296,7 +1302,7 @@
             </a:ln>
             <a:extLst>
               <a:ext uri="{91240B29-F687-4f45-9708-019B960494DF}">
-                <a14:hiddenLine xmlns:a14="http://schemas.microsoft.com/office/drawing/2010/main" xmlns="" w="9525">
+                <a14:hiddenLine xmlns="" xmlns:a14="http://schemas.microsoft.com/office/drawing/2010/main" w="9525">
                   <a:solidFill>
                     <a:srgbClr val="000000"/>
                   </a:solidFill>
@@ -1386,7 +1392,7 @@
             </a:ln>
             <a:extLst>
               <a:ext uri="{91240B29-F687-4f45-9708-019B960494DF}">
-                <a14:hiddenLine xmlns:a14="http://schemas.microsoft.com/office/drawing/2010/main" xmlns="" w="9525">
+                <a14:hiddenLine xmlns="" xmlns:a14="http://schemas.microsoft.com/office/drawing/2010/main" w="9525">
                   <a:solidFill>
                     <a:srgbClr val="000000"/>
                   </a:solidFill>
@@ -1476,7 +1482,7 @@
             </a:ln>
             <a:extLst>
               <a:ext uri="{91240B29-F687-4f45-9708-019B960494DF}">
-                <a14:hiddenLine xmlns:a14="http://schemas.microsoft.com/office/drawing/2010/main" xmlns="" w="9525">
+                <a14:hiddenLine xmlns="" xmlns:a14="http://schemas.microsoft.com/office/drawing/2010/main" w="9525">
                   <a:solidFill>
                     <a:srgbClr val="000000"/>
                   </a:solidFill>
@@ -1538,7 +1544,7 @@
             </a:ln>
             <a:extLst>
               <a:ext uri="{91240B29-F687-4f45-9708-019B960494DF}">
-                <a14:hiddenLine xmlns:a14="http://schemas.microsoft.com/office/drawing/2010/main" xmlns="" w="9525">
+                <a14:hiddenLine xmlns="" xmlns:a14="http://schemas.microsoft.com/office/drawing/2010/main" w="9525">
                   <a:solidFill>
                     <a:srgbClr val="000000"/>
                   </a:solidFill>
@@ -1628,7 +1634,7 @@
             </a:ln>
             <a:extLst>
               <a:ext uri="{91240B29-F687-4f45-9708-019B960494DF}">
-                <a14:hiddenLine xmlns:a14="http://schemas.microsoft.com/office/drawing/2010/main" xmlns="" w="9525">
+                <a14:hiddenLine xmlns="" xmlns:a14="http://schemas.microsoft.com/office/drawing/2010/main" w="9525">
                   <a:solidFill>
                     <a:srgbClr val="000000"/>
                   </a:solidFill>
@@ -1718,7 +1724,7 @@
             </a:ln>
             <a:extLst>
               <a:ext uri="{91240B29-F687-4f45-9708-019B960494DF}">
-                <a14:hiddenLine xmlns:a14="http://schemas.microsoft.com/office/drawing/2010/main" xmlns="" w="9525">
+                <a14:hiddenLine xmlns="" xmlns:a14="http://schemas.microsoft.com/office/drawing/2010/main" w="9525">
                   <a:solidFill>
                     <a:srgbClr val="000000"/>
                   </a:solidFill>
@@ -1774,7 +1780,7 @@
             </a:ln>
             <a:extLst>
               <a:ext uri="{91240B29-F687-4f45-9708-019B960494DF}">
-                <a14:hiddenLine xmlns:a14="http://schemas.microsoft.com/office/drawing/2010/main" xmlns="" w="9525">
+                <a14:hiddenLine xmlns="" xmlns:a14="http://schemas.microsoft.com/office/drawing/2010/main" w="9525">
                   <a:solidFill>
                     <a:srgbClr val="000000"/>
                   </a:solidFill>
@@ -1864,7 +1870,7 @@
             </a:ln>
             <a:extLst>
               <a:ext uri="{91240B29-F687-4f45-9708-019B960494DF}">
-                <a14:hiddenLine xmlns:a14="http://schemas.microsoft.com/office/drawing/2010/main" xmlns="" w="9525">
+                <a14:hiddenLine xmlns="" xmlns:a14="http://schemas.microsoft.com/office/drawing/2010/main" w="9525">
                   <a:solidFill>
                     <a:srgbClr val="000000"/>
                   </a:solidFill>
@@ -1920,7 +1926,7 @@
             </a:ln>
             <a:extLst>
               <a:ext uri="{91240B29-F687-4f45-9708-019B960494DF}">
-                <a14:hiddenLine xmlns:a14="http://schemas.microsoft.com/office/drawing/2010/main" xmlns="" w="9525">
+                <a14:hiddenLine xmlns="" xmlns:a14="http://schemas.microsoft.com/office/drawing/2010/main" w="9525">
                   <a:solidFill>
                     <a:srgbClr val="000000"/>
                   </a:solidFill>
@@ -2010,7 +2016,7 @@
             </a:ln>
             <a:extLst>
               <a:ext uri="{91240B29-F687-4f45-9708-019B960494DF}">
-                <a14:hiddenLine xmlns:a14="http://schemas.microsoft.com/office/drawing/2010/main" xmlns="" w="9525">
+                <a14:hiddenLine xmlns="" xmlns:a14="http://schemas.microsoft.com/office/drawing/2010/main" w="9525">
                   <a:solidFill>
                     <a:srgbClr val="000000"/>
                   </a:solidFill>
@@ -2078,7 +2084,7 @@
             </a:ln>
             <a:extLst>
               <a:ext uri="{91240B29-F687-4f45-9708-019B960494DF}">
-                <a14:hiddenLine xmlns:a14="http://schemas.microsoft.com/office/drawing/2010/main" xmlns="" w="9525">
+                <a14:hiddenLine xmlns="" xmlns:a14="http://schemas.microsoft.com/office/drawing/2010/main" w="9525">
                   <a:solidFill>
                     <a:srgbClr val="000000"/>
                   </a:solidFill>
@@ -2168,7 +2174,7 @@
             </a:ln>
             <a:extLst>
               <a:ext uri="{91240B29-F687-4f45-9708-019B960494DF}">
-                <a14:hiddenLine xmlns:a14="http://schemas.microsoft.com/office/drawing/2010/main" xmlns="" w="9525">
+                <a14:hiddenLine xmlns="" xmlns:a14="http://schemas.microsoft.com/office/drawing/2010/main" w="9525">
                   <a:solidFill>
                     <a:srgbClr val="000000"/>
                   </a:solidFill>
@@ -2236,7 +2242,7 @@
             </a:ln>
             <a:extLst>
               <a:ext uri="{91240B29-F687-4f45-9708-019B960494DF}">
-                <a14:hiddenLine xmlns:a14="http://schemas.microsoft.com/office/drawing/2010/main" xmlns="" w="9525">
+                <a14:hiddenLine xmlns="" xmlns:a14="http://schemas.microsoft.com/office/drawing/2010/main" w="9525">
                   <a:solidFill>
                     <a:srgbClr val="000000"/>
                   </a:solidFill>
@@ -2326,7 +2332,7 @@
             </a:ln>
             <a:extLst>
               <a:ext uri="{91240B29-F687-4f45-9708-019B960494DF}">
-                <a14:hiddenLine xmlns:a14="http://schemas.microsoft.com/office/drawing/2010/main" xmlns="" w="9525">
+                <a14:hiddenLine xmlns="" xmlns:a14="http://schemas.microsoft.com/office/drawing/2010/main" w="9525">
                   <a:solidFill>
                     <a:srgbClr val="000000"/>
                   </a:solidFill>
@@ -2360,7 +2366,7 @@
             </a:ln>
             <a:extLst>
               <a:ext uri="{91240B29-F687-4f45-9708-019B960494DF}">
-                <a14:hiddenLine xmlns:a14="http://schemas.microsoft.com/office/drawing/2010/main" xmlns="" w="9525">
+                <a14:hiddenLine xmlns="" xmlns:a14="http://schemas.microsoft.com/office/drawing/2010/main" w="9525">
                   <a:solidFill>
                     <a:srgbClr val="000000"/>
                   </a:solidFill>
@@ -2450,7 +2456,7 @@
             </a:ln>
             <a:extLst>
               <a:ext uri="{91240B29-F687-4f45-9708-019B960494DF}">
-                <a14:hiddenLine xmlns:a14="http://schemas.microsoft.com/office/drawing/2010/main" xmlns="" w="9525">
+                <a14:hiddenLine xmlns="" xmlns:a14="http://schemas.microsoft.com/office/drawing/2010/main" w="9525">
                   <a:solidFill>
                     <a:srgbClr val="000000"/>
                   </a:solidFill>
@@ -2512,7 +2518,7 @@
             </a:ln>
             <a:extLst>
               <a:ext uri="{91240B29-F687-4f45-9708-019B960494DF}">
-                <a14:hiddenLine xmlns:a14="http://schemas.microsoft.com/office/drawing/2010/main" xmlns="" w="9525">
+                <a14:hiddenLine xmlns="" xmlns:a14="http://schemas.microsoft.com/office/drawing/2010/main" w="9525">
                   <a:solidFill>
                     <a:srgbClr val="000000"/>
                   </a:solidFill>
@@ -2574,7 +2580,7 @@
             </a:ln>
             <a:extLst>
               <a:ext uri="{91240B29-F687-4f45-9708-019B960494DF}">
-                <a14:hiddenLine xmlns:a14="http://schemas.microsoft.com/office/drawing/2010/main" xmlns="" w="9525">
+                <a14:hiddenLine xmlns="" xmlns:a14="http://schemas.microsoft.com/office/drawing/2010/main" w="9525">
                   <a:solidFill>
                     <a:srgbClr val="000000"/>
                   </a:solidFill>
@@ -2664,7 +2670,7 @@
             </a:ln>
             <a:extLst>
               <a:ext uri="{91240B29-F687-4f45-9708-019B960494DF}">
-                <a14:hiddenLine xmlns:a14="http://schemas.microsoft.com/office/drawing/2010/main" xmlns="" w="9525">
+                <a14:hiddenLine xmlns="" xmlns:a14="http://schemas.microsoft.com/office/drawing/2010/main" w="9525">
                   <a:solidFill>
                     <a:srgbClr val="000000"/>
                   </a:solidFill>
@@ -2732,7 +2738,7 @@
             </a:ln>
             <a:extLst>
               <a:ext uri="{91240B29-F687-4f45-9708-019B960494DF}">
-                <a14:hiddenLine xmlns:a14="http://schemas.microsoft.com/office/drawing/2010/main" xmlns="" w="9525">
+                <a14:hiddenLine xmlns="" xmlns:a14="http://schemas.microsoft.com/office/drawing/2010/main" w="9525">
                   <a:solidFill>
                     <a:srgbClr val="000000"/>
                   </a:solidFill>
@@ -2794,7 +2800,7 @@
             </a:ln>
             <a:extLst>
               <a:ext uri="{91240B29-F687-4f45-9708-019B960494DF}">
-                <a14:hiddenLine xmlns:a14="http://schemas.microsoft.com/office/drawing/2010/main" xmlns="" w="9525">
+                <a14:hiddenLine xmlns="" xmlns:a14="http://schemas.microsoft.com/office/drawing/2010/main" w="9525">
                   <a:solidFill>
                     <a:srgbClr val="000000"/>
                   </a:solidFill>
@@ -2884,7 +2890,7 @@
             </a:ln>
             <a:extLst>
               <a:ext uri="{91240B29-F687-4f45-9708-019B960494DF}">
-                <a14:hiddenLine xmlns:a14="http://schemas.microsoft.com/office/drawing/2010/main" xmlns="" w="9525">
+                <a14:hiddenLine xmlns="" xmlns:a14="http://schemas.microsoft.com/office/drawing/2010/main" w="9525">
                   <a:solidFill>
                     <a:srgbClr val="000000"/>
                   </a:solidFill>
@@ -2946,7 +2952,7 @@
             </a:ln>
             <a:extLst>
               <a:ext uri="{91240B29-F687-4f45-9708-019B960494DF}">
-                <a14:hiddenLine xmlns:a14="http://schemas.microsoft.com/office/drawing/2010/main" xmlns="" w="9525">
+                <a14:hiddenLine xmlns="" xmlns:a14="http://schemas.microsoft.com/office/drawing/2010/main" w="9525">
                   <a:solidFill>
                     <a:srgbClr val="000000"/>
                   </a:solidFill>
@@ -3036,7 +3042,7 @@
             </a:ln>
             <a:extLst>
               <a:ext uri="{91240B29-F687-4f45-9708-019B960494DF}">
-                <a14:hiddenLine xmlns:a14="http://schemas.microsoft.com/office/drawing/2010/main" xmlns="" w="9525">
+                <a14:hiddenLine xmlns="" xmlns:a14="http://schemas.microsoft.com/office/drawing/2010/main" w="9525">
                   <a:solidFill>
                     <a:srgbClr val="000000"/>
                   </a:solidFill>
@@ -3098,7 +3104,7 @@
             </a:ln>
             <a:extLst>
               <a:ext uri="{91240B29-F687-4f45-9708-019B960494DF}">
-                <a14:hiddenLine xmlns:a14="http://schemas.microsoft.com/office/drawing/2010/main" xmlns="" w="9525">
+                <a14:hiddenLine xmlns="" xmlns:a14="http://schemas.microsoft.com/office/drawing/2010/main" w="9525">
                   <a:solidFill>
                     <a:srgbClr val="000000"/>
                   </a:solidFill>
@@ -3188,7 +3194,7 @@
             </a:ln>
             <a:extLst>
               <a:ext uri="{91240B29-F687-4f45-9708-019B960494DF}">
-                <a14:hiddenLine xmlns:a14="http://schemas.microsoft.com/office/drawing/2010/main" xmlns="" w="9525">
+                <a14:hiddenLine xmlns="" xmlns:a14="http://schemas.microsoft.com/office/drawing/2010/main" w="9525">
                   <a:solidFill>
                     <a:srgbClr val="000000"/>
                   </a:solidFill>
@@ -3222,7 +3228,7 @@
             </a:ln>
             <a:extLst>
               <a:ext uri="{91240B29-F687-4f45-9708-019B960494DF}">
-                <a14:hiddenLine xmlns:a14="http://schemas.microsoft.com/office/drawing/2010/main" xmlns="" w="9525">
+                <a14:hiddenLine xmlns="" xmlns:a14="http://schemas.microsoft.com/office/drawing/2010/main" w="9525">
                   <a:solidFill>
                     <a:srgbClr val="000000"/>
                   </a:solidFill>
@@ -3287,7 +3293,7 @@
             </a:ln>
             <a:extLst>
               <a:ext uri="{91240B29-F687-4f45-9708-019B960494DF}">
-                <a14:hiddenLine xmlns:a14="http://schemas.microsoft.com/office/drawing/2010/main" xmlns="" w="9525">
+                <a14:hiddenLine xmlns="" xmlns:a14="http://schemas.microsoft.com/office/drawing/2010/main" w="9525">
                   <a:solidFill>
                     <a:srgbClr val="000000"/>
                   </a:solidFill>
@@ -3377,7 +3383,7 @@
             </a:ln>
             <a:extLst>
               <a:ext uri="{91240B29-F687-4f45-9708-019B960494DF}">
-                <a14:hiddenLine xmlns:a14="http://schemas.microsoft.com/office/drawing/2010/main" xmlns="" w="9525">
+                <a14:hiddenLine xmlns="" xmlns:a14="http://schemas.microsoft.com/office/drawing/2010/main" w="9525">
                   <a:solidFill>
                     <a:srgbClr val="000000"/>
                   </a:solidFill>
@@ -3439,7 +3445,7 @@
             </a:ln>
             <a:extLst>
               <a:ext uri="{91240B29-F687-4f45-9708-019B960494DF}">
-                <a14:hiddenLine xmlns:a14="http://schemas.microsoft.com/office/drawing/2010/main" xmlns="" w="9525">
+                <a14:hiddenLine xmlns="" xmlns:a14="http://schemas.microsoft.com/office/drawing/2010/main" w="9525">
                   <a:solidFill>
                     <a:srgbClr val="000000"/>
                   </a:solidFill>
@@ -3529,7 +3535,7 @@
             </a:ln>
             <a:extLst>
               <a:ext uri="{91240B29-F687-4f45-9708-019B960494DF}">
-                <a14:hiddenLine xmlns:a14="http://schemas.microsoft.com/office/drawing/2010/main" xmlns="" w="9525">
+                <a14:hiddenLine xmlns="" xmlns:a14="http://schemas.microsoft.com/office/drawing/2010/main" w="9525">
                   <a:solidFill>
                     <a:srgbClr val="000000"/>
                   </a:solidFill>
@@ -3619,7 +3625,7 @@
             </a:ln>
             <a:extLst>
               <a:ext uri="{91240B29-F687-4f45-9708-019B960494DF}">
-                <a14:hiddenLine xmlns:a14="http://schemas.microsoft.com/office/drawing/2010/main" xmlns="" w="9525">
+                <a14:hiddenLine xmlns="" xmlns:a14="http://schemas.microsoft.com/office/drawing/2010/main" w="9525">
                   <a:solidFill>
                     <a:srgbClr val="000000"/>
                   </a:solidFill>
@@ -3684,7 +3690,7 @@
             </a:ln>
             <a:extLst>
               <a:ext uri="{91240B29-F687-4f45-9708-019B960494DF}">
-                <a14:hiddenLine xmlns:a14="http://schemas.microsoft.com/office/drawing/2010/main" xmlns="" w="9525">
+                <a14:hiddenLine xmlns="" xmlns:a14="http://schemas.microsoft.com/office/drawing/2010/main" w="9525">
                   <a:solidFill>
                     <a:srgbClr val="000000"/>
                   </a:solidFill>
@@ -3746,7 +3752,7 @@
             </a:ln>
             <a:extLst>
               <a:ext uri="{91240B29-F687-4f45-9708-019B960494DF}">
-                <a14:hiddenLine xmlns:a14="http://schemas.microsoft.com/office/drawing/2010/main" xmlns="" w="9525">
+                <a14:hiddenLine xmlns="" xmlns:a14="http://schemas.microsoft.com/office/drawing/2010/main" w="9525">
                   <a:solidFill>
                     <a:srgbClr val="000000"/>
                   </a:solidFill>
@@ -3836,7 +3842,7 @@
             </a:ln>
             <a:extLst>
               <a:ext uri="{91240B29-F687-4f45-9708-019B960494DF}">
-                <a14:hiddenLine xmlns:a14="http://schemas.microsoft.com/office/drawing/2010/main" xmlns="" w="9525">
+                <a14:hiddenLine xmlns="" xmlns:a14="http://schemas.microsoft.com/office/drawing/2010/main" w="9525">
                   <a:solidFill>
                     <a:srgbClr val="000000"/>
                   </a:solidFill>
@@ -3926,7 +3932,7 @@
             </a:ln>
             <a:extLst>
               <a:ext uri="{91240B29-F687-4f45-9708-019B960494DF}">
-                <a14:hiddenLine xmlns:a14="http://schemas.microsoft.com/office/drawing/2010/main" xmlns="" w="9525">
+                <a14:hiddenLine xmlns="" xmlns:a14="http://schemas.microsoft.com/office/drawing/2010/main" w="9525">
                   <a:solidFill>
                     <a:srgbClr val="000000"/>
                   </a:solidFill>
@@ -3988,7 +3994,7 @@
             </a:ln>
             <a:extLst>
               <a:ext uri="{91240B29-F687-4f45-9708-019B960494DF}">
-                <a14:hiddenLine xmlns:a14="http://schemas.microsoft.com/office/drawing/2010/main" xmlns="" w="9525">
+                <a14:hiddenLine xmlns="" xmlns:a14="http://schemas.microsoft.com/office/drawing/2010/main" w="9525">
                   <a:solidFill>
                     <a:srgbClr val="000000"/>
                   </a:solidFill>
@@ -4108,7 +4114,7 @@
             </a:ln>
             <a:extLst>
               <a:ext uri="{91240B29-F687-4f45-9708-019B960494DF}">
-                <a14:hiddenLine xmlns:a14="http://schemas.microsoft.com/office/drawing/2010/main" xmlns="" w="9525">
+                <a14:hiddenLine xmlns="" xmlns:a14="http://schemas.microsoft.com/office/drawing/2010/main" w="9525">
                   <a:solidFill>
                     <a:srgbClr val="000000"/>
                   </a:solidFill>
@@ -4176,7 +4182,7 @@
             </a:ln>
             <a:extLst>
               <a:ext uri="{91240B29-F687-4f45-9708-019B960494DF}">
-                <a14:hiddenLine xmlns:a14="http://schemas.microsoft.com/office/drawing/2010/main" xmlns="" w="9525">
+                <a14:hiddenLine xmlns="" xmlns:a14="http://schemas.microsoft.com/office/drawing/2010/main" w="9525">
                   <a:solidFill>
                     <a:srgbClr val="000000"/>
                   </a:solidFill>
@@ -4266,7 +4272,7 @@
             </a:ln>
             <a:extLst>
               <a:ext uri="{91240B29-F687-4f45-9708-019B960494DF}">
-                <a14:hiddenLine xmlns:a14="http://schemas.microsoft.com/office/drawing/2010/main" xmlns="" w="9525">
+                <a14:hiddenLine xmlns="" xmlns:a14="http://schemas.microsoft.com/office/drawing/2010/main" w="9525">
                   <a:solidFill>
                     <a:srgbClr val="000000"/>
                   </a:solidFill>
@@ -4406,7 +4412,7 @@
           <a:p>
             <a:fld id="{20D0EC40-9780-4276-8717-96BFA49318A6}" type="datetimeFigureOut">
               <a:rPr lang="pt-BR" smtClean="0"/>
-              <a:t>18/07/2021</a:t>
+              <a:t>20/07/2021</a:t>
             </a:fld>
             <a:endParaRPr lang="pt-BR"/>
           </a:p>
@@ -4673,7 +4679,7 @@
           <a:p>
             <a:fld id="{20D0EC40-9780-4276-8717-96BFA49318A6}" type="datetimeFigureOut">
               <a:rPr lang="pt-BR" smtClean="0"/>
-              <a:t>18/07/2021</a:t>
+              <a:t>20/07/2021</a:t>
             </a:fld>
             <a:endParaRPr lang="pt-BR"/>
           </a:p>
@@ -4869,7 +4875,7 @@
           <a:p>
             <a:fld id="{20D0EC40-9780-4276-8717-96BFA49318A6}" type="datetimeFigureOut">
               <a:rPr lang="pt-BR" smtClean="0"/>
-              <a:t>18/07/2021</a:t>
+              <a:t>20/07/2021</a:t>
             </a:fld>
             <a:endParaRPr lang="pt-BR"/>
           </a:p>
@@ -5132,7 +5138,7 @@
           <a:p>
             <a:fld id="{20D0EC40-9780-4276-8717-96BFA49318A6}" type="datetimeFigureOut">
               <a:rPr lang="pt-BR" smtClean="0"/>
-              <a:t>18/07/2021</a:t>
+              <a:t>20/07/2021</a:t>
             </a:fld>
             <a:endParaRPr lang="pt-BR"/>
           </a:p>
@@ -5566,7 +5572,7 @@
           <a:p>
             <a:fld id="{20D0EC40-9780-4276-8717-96BFA49318A6}" type="datetimeFigureOut">
               <a:rPr lang="pt-BR" smtClean="0"/>
-              <a:t>18/07/2021</a:t>
+              <a:t>20/07/2021</a:t>
             </a:fld>
             <a:endParaRPr lang="pt-BR"/>
           </a:p>
@@ -6112,7 +6118,7 @@
           <a:p>
             <a:fld id="{20D0EC40-9780-4276-8717-96BFA49318A6}" type="datetimeFigureOut">
               <a:rPr lang="pt-BR" smtClean="0"/>
-              <a:t>18/07/2021</a:t>
+              <a:t>20/07/2021</a:t>
             </a:fld>
             <a:endParaRPr lang="pt-BR"/>
           </a:p>
@@ -6832,7 +6838,7 @@
           <a:p>
             <a:fld id="{20D0EC40-9780-4276-8717-96BFA49318A6}" type="datetimeFigureOut">
               <a:rPr lang="pt-BR" smtClean="0"/>
-              <a:t>18/07/2021</a:t>
+              <a:t>20/07/2021</a:t>
             </a:fld>
             <a:endParaRPr lang="pt-BR"/>
           </a:p>
@@ -7002,7 +7008,7 @@
           <a:p>
             <a:fld id="{20D0EC40-9780-4276-8717-96BFA49318A6}" type="datetimeFigureOut">
               <a:rPr lang="pt-BR" smtClean="0"/>
-              <a:t>18/07/2021</a:t>
+              <a:t>20/07/2021</a:t>
             </a:fld>
             <a:endParaRPr lang="pt-BR"/>
           </a:p>
@@ -7182,7 +7188,7 @@
           <a:p>
             <a:fld id="{20D0EC40-9780-4276-8717-96BFA49318A6}" type="datetimeFigureOut">
               <a:rPr lang="pt-BR" smtClean="0"/>
-              <a:t>18/07/2021</a:t>
+              <a:t>20/07/2021</a:t>
             </a:fld>
             <a:endParaRPr lang="pt-BR"/>
           </a:p>
@@ -7352,7 +7358,7 @@
           <a:p>
             <a:fld id="{20D0EC40-9780-4276-8717-96BFA49318A6}" type="datetimeFigureOut">
               <a:rPr lang="pt-BR" smtClean="0"/>
-              <a:t>18/07/2021</a:t>
+              <a:t>20/07/2021</a:t>
             </a:fld>
             <a:endParaRPr lang="pt-BR"/>
           </a:p>
@@ -7602,7 +7608,7 @@
           <a:p>
             <a:fld id="{20D0EC40-9780-4276-8717-96BFA49318A6}" type="datetimeFigureOut">
               <a:rPr lang="pt-BR" smtClean="0"/>
-              <a:t>18/07/2021</a:t>
+              <a:t>20/07/2021</a:t>
             </a:fld>
             <a:endParaRPr lang="pt-BR"/>
           </a:p>
@@ -7834,7 +7840,7 @@
           <a:p>
             <a:fld id="{20D0EC40-9780-4276-8717-96BFA49318A6}" type="datetimeFigureOut">
               <a:rPr lang="pt-BR" smtClean="0"/>
-              <a:t>18/07/2021</a:t>
+              <a:t>20/07/2021</a:t>
             </a:fld>
             <a:endParaRPr lang="pt-BR"/>
           </a:p>
@@ -8215,7 +8221,7 @@
           <a:p>
             <a:fld id="{20D0EC40-9780-4276-8717-96BFA49318A6}" type="datetimeFigureOut">
               <a:rPr lang="pt-BR" smtClean="0"/>
-              <a:t>18/07/2021</a:t>
+              <a:t>20/07/2021</a:t>
             </a:fld>
             <a:endParaRPr lang="pt-BR"/>
           </a:p>
@@ -8333,7 +8339,7 @@
           <a:p>
             <a:fld id="{20D0EC40-9780-4276-8717-96BFA49318A6}" type="datetimeFigureOut">
               <a:rPr lang="pt-BR" smtClean="0"/>
-              <a:t>18/07/2021</a:t>
+              <a:t>20/07/2021</a:t>
             </a:fld>
             <a:endParaRPr lang="pt-BR"/>
           </a:p>
@@ -8428,7 +8434,7 @@
           <a:p>
             <a:fld id="{20D0EC40-9780-4276-8717-96BFA49318A6}" type="datetimeFigureOut">
               <a:rPr lang="pt-BR" smtClean="0"/>
-              <a:t>18/07/2021</a:t>
+              <a:t>20/07/2021</a:t>
             </a:fld>
             <a:endParaRPr lang="pt-BR"/>
           </a:p>
@@ -8677,7 +8683,7 @@
           <a:p>
             <a:fld id="{20D0EC40-9780-4276-8717-96BFA49318A6}" type="datetimeFigureOut">
               <a:rPr lang="pt-BR" smtClean="0"/>
-              <a:t>18/07/2021</a:t>
+              <a:t>20/07/2021</a:t>
             </a:fld>
             <a:endParaRPr lang="pt-BR"/>
           </a:p>
@@ -8957,7 +8963,7 @@
           <a:p>
             <a:fld id="{20D0EC40-9780-4276-8717-96BFA49318A6}" type="datetimeFigureOut">
               <a:rPr lang="pt-BR" smtClean="0"/>
-              <a:t>18/07/2021</a:t>
+              <a:t>20/07/2021</a:t>
             </a:fld>
             <a:endParaRPr lang="pt-BR"/>
           </a:p>
@@ -9080,7 +9086,7 @@
           <a:noFill/>
           <a:extLst>
             <a:ext uri="{909E8E84-426E-40dd-AFC4-6F175D3DCCD1}">
-              <a14:hiddenFill xmlns:a14="http://schemas.microsoft.com/office/drawing/2010/main" xmlns="">
+              <a14:hiddenFill xmlns="" xmlns:a14="http://schemas.microsoft.com/office/drawing/2010/main">
                 <a:solidFill>
                   <a:srgbClr val="FFFFFF"/>
                 </a:solidFill>
@@ -9154,7 +9160,7 @@
               </a:ln>
               <a:extLst>
                 <a:ext uri="{91240B29-F687-4f45-9708-019B960494DF}">
-                  <a14:hiddenLine xmlns:a14="http://schemas.microsoft.com/office/drawing/2010/main" xmlns="" w="9525">
+                  <a14:hiddenLine xmlns="" xmlns:a14="http://schemas.microsoft.com/office/drawing/2010/main" w="9525">
                     <a:solidFill>
                       <a:srgbClr val="000000"/>
                     </a:solidFill>
@@ -9244,7 +9250,7 @@
               </a:ln>
               <a:extLst>
                 <a:ext uri="{91240B29-F687-4f45-9708-019B960494DF}">
-                  <a14:hiddenLine xmlns:a14="http://schemas.microsoft.com/office/drawing/2010/main" xmlns="" w="9525">
+                  <a14:hiddenLine xmlns="" xmlns:a14="http://schemas.microsoft.com/office/drawing/2010/main" w="9525">
                     <a:solidFill>
                       <a:srgbClr val="000000"/>
                     </a:solidFill>
@@ -9334,7 +9340,7 @@
               </a:ln>
               <a:extLst>
                 <a:ext uri="{91240B29-F687-4f45-9708-019B960494DF}">
-                  <a14:hiddenLine xmlns:a14="http://schemas.microsoft.com/office/drawing/2010/main" xmlns="" w="9525">
+                  <a14:hiddenLine xmlns="" xmlns:a14="http://schemas.microsoft.com/office/drawing/2010/main" w="9525">
                     <a:solidFill>
                       <a:srgbClr val="000000"/>
                     </a:solidFill>
@@ -9396,7 +9402,7 @@
               </a:ln>
               <a:extLst>
                 <a:ext uri="{91240B29-F687-4f45-9708-019B960494DF}">
-                  <a14:hiddenLine xmlns:a14="http://schemas.microsoft.com/office/drawing/2010/main" xmlns="" w="9525">
+                  <a14:hiddenLine xmlns="" xmlns:a14="http://schemas.microsoft.com/office/drawing/2010/main" w="9525">
                     <a:solidFill>
                       <a:srgbClr val="000000"/>
                     </a:solidFill>
@@ -9486,7 +9492,7 @@
               </a:ln>
               <a:extLst>
                 <a:ext uri="{91240B29-F687-4f45-9708-019B960494DF}">
-                  <a14:hiddenLine xmlns:a14="http://schemas.microsoft.com/office/drawing/2010/main" xmlns="" w="9525">
+                  <a14:hiddenLine xmlns="" xmlns:a14="http://schemas.microsoft.com/office/drawing/2010/main" w="9525">
                     <a:solidFill>
                       <a:srgbClr val="000000"/>
                     </a:solidFill>
@@ -9548,7 +9554,7 @@
               </a:ln>
               <a:extLst>
                 <a:ext uri="{91240B29-F687-4f45-9708-019B960494DF}">
-                  <a14:hiddenLine xmlns:a14="http://schemas.microsoft.com/office/drawing/2010/main" xmlns="" w="9525">
+                  <a14:hiddenLine xmlns="" xmlns:a14="http://schemas.microsoft.com/office/drawing/2010/main" w="9525">
                     <a:solidFill>
                       <a:srgbClr val="000000"/>
                     </a:solidFill>
@@ -9610,7 +9616,7 @@
               </a:ln>
               <a:extLst>
                 <a:ext uri="{91240B29-F687-4f45-9708-019B960494DF}">
-                  <a14:hiddenLine xmlns:a14="http://schemas.microsoft.com/office/drawing/2010/main" xmlns="" w="9525">
+                  <a14:hiddenLine xmlns="" xmlns:a14="http://schemas.microsoft.com/office/drawing/2010/main" w="9525">
                     <a:solidFill>
                       <a:srgbClr val="000000"/>
                     </a:solidFill>
@@ -9700,7 +9706,7 @@
               </a:ln>
               <a:extLst>
                 <a:ext uri="{91240B29-F687-4f45-9708-019B960494DF}">
-                  <a14:hiddenLine xmlns:a14="http://schemas.microsoft.com/office/drawing/2010/main" xmlns="" w="9525">
+                  <a14:hiddenLine xmlns="" xmlns:a14="http://schemas.microsoft.com/office/drawing/2010/main" w="9525">
                     <a:solidFill>
                       <a:srgbClr val="000000"/>
                     </a:solidFill>
@@ -9790,7 +9796,7 @@
               </a:ln>
               <a:extLst>
                 <a:ext uri="{91240B29-F687-4f45-9708-019B960494DF}">
-                  <a14:hiddenLine xmlns:a14="http://schemas.microsoft.com/office/drawing/2010/main" xmlns="" w="9525">
+                  <a14:hiddenLine xmlns="" xmlns:a14="http://schemas.microsoft.com/office/drawing/2010/main" w="9525">
                     <a:solidFill>
                       <a:srgbClr val="000000"/>
                     </a:solidFill>
@@ -9852,7 +9858,7 @@
               </a:ln>
               <a:extLst>
                 <a:ext uri="{91240B29-F687-4f45-9708-019B960494DF}">
-                  <a14:hiddenLine xmlns:a14="http://schemas.microsoft.com/office/drawing/2010/main" xmlns="" w="9525">
+                  <a14:hiddenLine xmlns="" xmlns:a14="http://schemas.microsoft.com/office/drawing/2010/main" w="9525">
                     <a:solidFill>
                       <a:srgbClr val="000000"/>
                     </a:solidFill>
@@ -9962,7 +9968,7 @@
               </a:ln>
               <a:extLst>
                 <a:ext uri="{91240B29-F687-4f45-9708-019B960494DF}">
-                  <a14:hiddenLine xmlns:a14="http://schemas.microsoft.com/office/drawing/2010/main" xmlns="" w="9525">
+                  <a14:hiddenLine xmlns="" xmlns:a14="http://schemas.microsoft.com/office/drawing/2010/main" w="9525">
                     <a:solidFill>
                       <a:srgbClr val="000000"/>
                     </a:solidFill>
@@ -10046,7 +10052,7 @@
               </a:ln>
               <a:extLst>
                 <a:ext uri="{91240B29-F687-4f45-9708-019B960494DF}">
-                  <a14:hiddenLine xmlns:a14="http://schemas.microsoft.com/office/drawing/2010/main" xmlns="" w="9525">
+                  <a14:hiddenLine xmlns="" xmlns:a14="http://schemas.microsoft.com/office/drawing/2010/main" w="9525">
                     <a:solidFill>
                       <a:srgbClr val="000000"/>
                     </a:solidFill>
@@ -10108,7 +10114,7 @@
               </a:ln>
               <a:extLst>
                 <a:ext uri="{91240B29-F687-4f45-9708-019B960494DF}">
-                  <a14:hiddenLine xmlns:a14="http://schemas.microsoft.com/office/drawing/2010/main" xmlns="" w="9525">
+                  <a14:hiddenLine xmlns="" xmlns:a14="http://schemas.microsoft.com/office/drawing/2010/main" w="9525">
                     <a:solidFill>
                       <a:srgbClr val="000000"/>
                     </a:solidFill>
@@ -10170,7 +10176,7 @@
               </a:ln>
               <a:extLst>
                 <a:ext uri="{91240B29-F687-4f45-9708-019B960494DF}">
-                  <a14:hiddenLine xmlns:a14="http://schemas.microsoft.com/office/drawing/2010/main" xmlns="" w="9525">
+                  <a14:hiddenLine xmlns="" xmlns:a14="http://schemas.microsoft.com/office/drawing/2010/main" w="9525">
                     <a:solidFill>
                       <a:srgbClr val="000000"/>
                     </a:solidFill>
@@ -10260,7 +10266,7 @@
               </a:ln>
               <a:extLst>
                 <a:ext uri="{91240B29-F687-4f45-9708-019B960494DF}">
-                  <a14:hiddenLine xmlns:a14="http://schemas.microsoft.com/office/drawing/2010/main" xmlns="" w="9525">
+                  <a14:hiddenLine xmlns="" xmlns:a14="http://schemas.microsoft.com/office/drawing/2010/main" w="9525">
                     <a:solidFill>
                       <a:srgbClr val="000000"/>
                     </a:solidFill>
@@ -10294,7 +10300,7 @@
               </a:ln>
               <a:extLst>
                 <a:ext uri="{91240B29-F687-4f45-9708-019B960494DF}">
-                  <a14:hiddenLine xmlns:a14="http://schemas.microsoft.com/office/drawing/2010/main" xmlns="" w="9525">
+                  <a14:hiddenLine xmlns="" xmlns:a14="http://schemas.microsoft.com/office/drawing/2010/main" w="9525">
                     <a:solidFill>
                       <a:srgbClr val="000000"/>
                     </a:solidFill>
@@ -10359,7 +10365,7 @@
               </a:ln>
               <a:extLst>
                 <a:ext uri="{91240B29-F687-4f45-9708-019B960494DF}">
-                  <a14:hiddenLine xmlns:a14="http://schemas.microsoft.com/office/drawing/2010/main" xmlns="" w="9525">
+                  <a14:hiddenLine xmlns="" xmlns:a14="http://schemas.microsoft.com/office/drawing/2010/main" w="9525">
                     <a:solidFill>
                       <a:srgbClr val="000000"/>
                     </a:solidFill>
@@ -10449,7 +10455,7 @@
               </a:ln>
               <a:extLst>
                 <a:ext uri="{91240B29-F687-4f45-9708-019B960494DF}">
-                  <a14:hiddenLine xmlns:a14="http://schemas.microsoft.com/office/drawing/2010/main" xmlns="" w="9525">
+                  <a14:hiddenLine xmlns="" xmlns:a14="http://schemas.microsoft.com/office/drawing/2010/main" w="9525">
                     <a:solidFill>
                       <a:srgbClr val="000000"/>
                     </a:solidFill>
@@ -10511,7 +10517,7 @@
               </a:ln>
               <a:extLst>
                 <a:ext uri="{91240B29-F687-4f45-9708-019B960494DF}">
-                  <a14:hiddenLine xmlns:a14="http://schemas.microsoft.com/office/drawing/2010/main" xmlns="" w="9525">
+                  <a14:hiddenLine xmlns="" xmlns:a14="http://schemas.microsoft.com/office/drawing/2010/main" w="9525">
                     <a:solidFill>
                       <a:srgbClr val="000000"/>
                     </a:solidFill>
@@ -10601,7 +10607,7 @@
               </a:ln>
               <a:extLst>
                 <a:ext uri="{91240B29-F687-4f45-9708-019B960494DF}">
-                  <a14:hiddenLine xmlns:a14="http://schemas.microsoft.com/office/drawing/2010/main" xmlns="" w="9525">
+                  <a14:hiddenLine xmlns="" xmlns:a14="http://schemas.microsoft.com/office/drawing/2010/main" w="9525">
                     <a:solidFill>
                       <a:srgbClr val="000000"/>
                     </a:solidFill>
@@ -10666,7 +10672,7 @@
               </a:ln>
               <a:extLst>
                 <a:ext uri="{91240B29-F687-4f45-9708-019B960494DF}">
-                  <a14:hiddenLine xmlns:a14="http://schemas.microsoft.com/office/drawing/2010/main" xmlns="" w="9525">
+                  <a14:hiddenLine xmlns="" xmlns:a14="http://schemas.microsoft.com/office/drawing/2010/main" w="9525">
                     <a:solidFill>
                       <a:srgbClr val="000000"/>
                     </a:solidFill>
@@ -10728,7 +10734,7 @@
               </a:ln>
               <a:extLst>
                 <a:ext uri="{91240B29-F687-4f45-9708-019B960494DF}">
-                  <a14:hiddenLine xmlns:a14="http://schemas.microsoft.com/office/drawing/2010/main" xmlns="" w="9525">
+                  <a14:hiddenLine xmlns="" xmlns:a14="http://schemas.microsoft.com/office/drawing/2010/main" w="9525">
                     <a:solidFill>
                       <a:srgbClr val="000000"/>
                     </a:solidFill>
@@ -10818,7 +10824,7 @@
               </a:ln>
               <a:extLst>
                 <a:ext uri="{91240B29-F687-4f45-9708-019B960494DF}">
-                  <a14:hiddenLine xmlns:a14="http://schemas.microsoft.com/office/drawing/2010/main" xmlns="" w="9525">
+                  <a14:hiddenLine xmlns="" xmlns:a14="http://schemas.microsoft.com/office/drawing/2010/main" w="9525">
                     <a:solidFill>
                       <a:srgbClr val="000000"/>
                     </a:solidFill>
@@ -10908,7 +10914,7 @@
               </a:ln>
               <a:extLst>
                 <a:ext uri="{91240B29-F687-4f45-9708-019B960494DF}">
-                  <a14:hiddenLine xmlns:a14="http://schemas.microsoft.com/office/drawing/2010/main" xmlns="" w="9525">
+                  <a14:hiddenLine xmlns="" xmlns:a14="http://schemas.microsoft.com/office/drawing/2010/main" w="9525">
                     <a:solidFill>
                       <a:srgbClr val="000000"/>
                     </a:solidFill>
@@ -10973,7 +10979,7 @@
               </a:ln>
               <a:extLst>
                 <a:ext uri="{91240B29-F687-4f45-9708-019B960494DF}">
-                  <a14:hiddenLine xmlns:a14="http://schemas.microsoft.com/office/drawing/2010/main" xmlns="" w="9525">
+                  <a14:hiddenLine xmlns="" xmlns:a14="http://schemas.microsoft.com/office/drawing/2010/main" w="9525">
                     <a:solidFill>
                       <a:srgbClr val="000000"/>
                     </a:solidFill>
@@ -11093,7 +11099,7 @@
               </a:ln>
               <a:extLst>
                 <a:ext uri="{91240B29-F687-4f45-9708-019B960494DF}">
-                  <a14:hiddenLine xmlns:a14="http://schemas.microsoft.com/office/drawing/2010/main" xmlns="" w="9525">
+                  <a14:hiddenLine xmlns="" xmlns:a14="http://schemas.microsoft.com/office/drawing/2010/main" w="9525">
                     <a:solidFill>
                       <a:srgbClr val="000000"/>
                     </a:solidFill>
@@ -11174,7 +11180,7 @@
               </a:ln>
               <a:extLst>
                 <a:ext uri="{91240B29-F687-4f45-9708-019B960494DF}">
-                  <a14:hiddenLine xmlns:a14="http://schemas.microsoft.com/office/drawing/2010/main" xmlns="" w="9525">
+                  <a14:hiddenLine xmlns="" xmlns:a14="http://schemas.microsoft.com/office/drawing/2010/main" w="9525">
                     <a:solidFill>
                       <a:srgbClr val="000000"/>
                     </a:solidFill>
@@ -11289,7 +11295,7 @@
               </a:ln>
               <a:extLst>
                 <a:ext uri="{91240B29-F687-4f45-9708-019B960494DF}">
-                  <a14:hiddenLine xmlns:a14="http://schemas.microsoft.com/office/drawing/2010/main" xmlns="" w="9525">
+                  <a14:hiddenLine xmlns="" xmlns:a14="http://schemas.microsoft.com/office/drawing/2010/main" w="9525">
                     <a:solidFill>
                       <a:srgbClr val="000000"/>
                     </a:solidFill>
@@ -11379,7 +11385,7 @@
               </a:ln>
               <a:extLst>
                 <a:ext uri="{91240B29-F687-4f45-9708-019B960494DF}">
-                  <a14:hiddenLine xmlns:a14="http://schemas.microsoft.com/office/drawing/2010/main" xmlns="" w="9525">
+                  <a14:hiddenLine xmlns="" xmlns:a14="http://schemas.microsoft.com/office/drawing/2010/main" w="9525">
                     <a:solidFill>
                       <a:srgbClr val="000000"/>
                     </a:solidFill>
@@ -11444,7 +11450,7 @@
               </a:ln>
               <a:extLst>
                 <a:ext uri="{91240B29-F687-4f45-9708-019B960494DF}">
-                  <a14:hiddenLine xmlns:a14="http://schemas.microsoft.com/office/drawing/2010/main" xmlns="" w="9525">
+                  <a14:hiddenLine xmlns="" xmlns:a14="http://schemas.microsoft.com/office/drawing/2010/main" w="9525">
                     <a:solidFill>
                       <a:srgbClr val="000000"/>
                     </a:solidFill>
@@ -11534,7 +11540,7 @@
               </a:ln>
               <a:extLst>
                 <a:ext uri="{91240B29-F687-4f45-9708-019B960494DF}">
-                  <a14:hiddenLine xmlns:a14="http://schemas.microsoft.com/office/drawing/2010/main" xmlns="" w="9525">
+                  <a14:hiddenLine xmlns="" xmlns:a14="http://schemas.microsoft.com/office/drawing/2010/main" w="9525">
                     <a:solidFill>
                       <a:srgbClr val="000000"/>
                     </a:solidFill>
@@ -11602,7 +11608,7 @@
               </a:ln>
               <a:extLst>
                 <a:ext uri="{91240B29-F687-4f45-9708-019B960494DF}">
-                  <a14:hiddenLine xmlns:a14="http://schemas.microsoft.com/office/drawing/2010/main" xmlns="" w="9525">
+                  <a14:hiddenLine xmlns="" xmlns:a14="http://schemas.microsoft.com/office/drawing/2010/main" w="9525">
                     <a:solidFill>
                       <a:srgbClr val="000000"/>
                     </a:solidFill>
@@ -11692,7 +11698,7 @@
               </a:ln>
               <a:extLst>
                 <a:ext uri="{91240B29-F687-4f45-9708-019B960494DF}">
-                  <a14:hiddenLine xmlns:a14="http://schemas.microsoft.com/office/drawing/2010/main" xmlns="" w="9525">
+                  <a14:hiddenLine xmlns="" xmlns:a14="http://schemas.microsoft.com/office/drawing/2010/main" w="9525">
                     <a:solidFill>
                       <a:srgbClr val="000000"/>
                     </a:solidFill>
@@ -11760,7 +11766,7 @@
               </a:ln>
               <a:extLst>
                 <a:ext uri="{91240B29-F687-4f45-9708-019B960494DF}">
-                  <a14:hiddenLine xmlns:a14="http://schemas.microsoft.com/office/drawing/2010/main" xmlns="" w="9525">
+                  <a14:hiddenLine xmlns="" xmlns:a14="http://schemas.microsoft.com/office/drawing/2010/main" w="9525">
                     <a:solidFill>
                       <a:srgbClr val="000000"/>
                     </a:solidFill>
@@ -11850,7 +11856,7 @@
               </a:ln>
               <a:extLst>
                 <a:ext uri="{91240B29-F687-4f45-9708-019B960494DF}">
-                  <a14:hiddenLine xmlns:a14="http://schemas.microsoft.com/office/drawing/2010/main" xmlns="" w="9525">
+                  <a14:hiddenLine xmlns="" xmlns:a14="http://schemas.microsoft.com/office/drawing/2010/main" w="9525">
                     <a:solidFill>
                       <a:srgbClr val="000000"/>
                     </a:solidFill>
@@ -11884,7 +11890,7 @@
               </a:ln>
               <a:extLst>
                 <a:ext uri="{91240B29-F687-4f45-9708-019B960494DF}">
-                  <a14:hiddenLine xmlns:a14="http://schemas.microsoft.com/office/drawing/2010/main" xmlns="" w="9525">
+                  <a14:hiddenLine xmlns="" xmlns:a14="http://schemas.microsoft.com/office/drawing/2010/main" w="9525">
                     <a:solidFill>
                       <a:srgbClr val="000000"/>
                     </a:solidFill>
@@ -12024,7 +12030,7 @@
           <a:p>
             <a:fld id="{20D0EC40-9780-4276-8717-96BFA49318A6}" type="datetimeFigureOut">
               <a:rPr lang="pt-BR" smtClean="0"/>
-              <a:t>18/07/2021</a:t>
+              <a:t>20/07/2021</a:t>
             </a:fld>
             <a:endParaRPr lang="pt-BR"/>
           </a:p>
@@ -12758,8 +12764,21 @@
             </a:r>
             <a:r>
               <a:rPr lang="pt-BR" dirty="0"/>
-              <a:t> log –p -1</a:t>
-            </a:r>
+              <a:t> log –p -1 || </a:t>
+            </a:r>
+            <a:r>
+              <a:rPr lang="pt-BR" dirty="0" err="1"/>
+              <a:t>git</a:t>
+            </a:r>
+            <a:r>
+              <a:rPr lang="pt-BR" dirty="0"/>
+              <a:t> log --</a:t>
+            </a:r>
+            <a:r>
+              <a:rPr lang="pt-BR" dirty="0" err="1"/>
+              <a:t>oneline</a:t>
+            </a:r>
+            <a:endParaRPr lang="pt-BR" dirty="0"/>
           </a:p>
           <a:p>
             <a:r>
@@ -12886,7 +12905,7 @@
         </p:spPr>
         <p:txBody>
           <a:bodyPr>
-            <a:normAutofit fontScale="85000" lnSpcReduction="10000"/>
+            <a:normAutofit fontScale="70000" lnSpcReduction="20000"/>
           </a:bodyPr>
           <a:lstStyle/>
           <a:p>
@@ -13082,6 +13101,28 @@
               <a:t>arquivo.extersao</a:t>
             </a:r>
             <a:endParaRPr lang="pt-BR" dirty="0"/>
+          </a:p>
+          <a:p>
+            <a:r>
+              <a:rPr lang="pt-BR" dirty="0"/>
+              <a:t>Remover um </a:t>
+            </a:r>
+            <a:r>
+              <a:rPr lang="pt-BR" dirty="0" err="1"/>
+              <a:t>commit</a:t>
+            </a:r>
+            <a:endParaRPr lang="pt-BR" dirty="0"/>
+          </a:p>
+          <a:p>
+            <a:pPr lvl="1"/>
+            <a:r>
+              <a:rPr lang="pt-BR" dirty="0" err="1"/>
+              <a:t>Git</a:t>
+            </a:r>
+            <a:r>
+              <a:rPr lang="pt-BR" dirty="0"/>
+              <a:t> reset –hard d302babd</a:t>
+            </a:r>
           </a:p>
           <a:p>
             <a:r>
@@ -13214,8 +13255,8 @@
         </p:nvSpPr>
         <p:spPr>
           <a:xfrm>
-            <a:off x="1141413" y="105509"/>
-            <a:ext cx="9905998" cy="1478570"/>
+            <a:off x="1141411" y="1"/>
+            <a:ext cx="9906000" cy="1378634"/>
           </a:xfrm>
         </p:spPr>
         <p:txBody>
@@ -13229,7 +13270,7 @@
               <a:rPr lang="pt-BR" sz="4000" dirty="0">
                 <a:latin typeface="Britannic Bold" panose="020B0903060703020204" pitchFamily="34" charset="0"/>
               </a:rPr>
-              <a:t>Teste local - TAG</a:t>
+              <a:t>Teste local</a:t>
             </a:r>
           </a:p>
         </p:txBody>
@@ -13247,13 +13288,13 @@
             <a:spLocks noGrp="1"/>
           </p:cNvSpPr>
           <p:nvPr>
-            <p:ph idx="1"/>
+            <p:ph sz="half" idx="2"/>
           </p:nvPr>
         </p:nvSpPr>
         <p:spPr>
           <a:xfrm>
-            <a:off x="1141412" y="1223890"/>
-            <a:ext cx="9905999" cy="5528602"/>
+            <a:off x="1026942" y="1519310"/>
+            <a:ext cx="4992860" cy="4881489"/>
           </a:xfrm>
         </p:spPr>
         <p:txBody>
@@ -13262,164 +13303,82 @@
           </a:bodyPr>
           <a:lstStyle/>
           <a:p>
+            <a:r>
+              <a:rPr lang="pt-BR" dirty="0"/>
+              <a:t>Grafo de </a:t>
+            </a:r>
+            <a:r>
+              <a:rPr lang="pt-BR" dirty="0" err="1"/>
+              <a:t>commits</a:t>
+            </a:r>
+            <a:endParaRPr lang="pt-BR" dirty="0"/>
+          </a:p>
+          <a:p>
             <a:pPr lvl="1"/>
-            <a:r>
-              <a:rPr lang="pt-BR" dirty="0"/>
-              <a:t>TAG</a:t>
-            </a:r>
-          </a:p>
-          <a:p>
-            <a:pPr lvl="2"/>
-            <a:r>
-              <a:rPr lang="pt-BR" dirty="0"/>
-              <a:t>Listar	</a:t>
-            </a:r>
-          </a:p>
-          <a:p>
-            <a:pPr lvl="3"/>
             <a:r>
               <a:rPr lang="pt-BR" dirty="0" err="1"/>
               <a:t>Git</a:t>
             </a:r>
             <a:r>
               <a:rPr lang="pt-BR" dirty="0"/>
-              <a:t> </a:t>
+              <a:t> log –</a:t>
             </a:r>
             <a:r>
               <a:rPr lang="pt-BR" dirty="0" err="1"/>
-              <a:t>tag</a:t>
+              <a:t>graph</a:t>
+            </a:r>
+            <a:r>
+              <a:rPr lang="pt-BR" dirty="0"/>
+              <a:t> --</a:t>
+            </a:r>
+            <a:r>
+              <a:rPr lang="pt-BR" dirty="0" err="1"/>
+              <a:t>oneline</a:t>
             </a:r>
             <a:endParaRPr lang="pt-BR" dirty="0"/>
           </a:p>
           <a:p>
-            <a:pPr lvl="2"/>
-            <a:r>
-              <a:rPr lang="pt-BR" dirty="0"/>
-              <a:t>Adicionar</a:t>
-            </a:r>
-          </a:p>
-          <a:p>
-            <a:pPr lvl="3"/>
+            <a:pPr lvl="1"/>
             <a:r>
               <a:rPr lang="pt-BR" dirty="0" err="1"/>
               <a:t>Git</a:t>
             </a:r>
             <a:r>
               <a:rPr lang="pt-BR" dirty="0"/>
-              <a:t> </a:t>
+              <a:t> log –</a:t>
             </a:r>
             <a:r>
               <a:rPr lang="pt-BR" dirty="0" err="1"/>
-              <a:t>tag</a:t>
-            </a:r>
+              <a:t>graph</a:t>
+            </a:r>
+            <a:endParaRPr lang="pt-BR" dirty="0"/>
+          </a:p>
+          <a:p>
             <a:r>
               <a:rPr lang="pt-BR" dirty="0"/>
-              <a:t> –a V1.0 –m “Versão 1.0”</a:t>
-            </a:r>
-          </a:p>
-          <a:p>
-            <a:pPr lvl="2"/>
+              <a:t>Mudar para determinado </a:t>
+            </a:r>
+            <a:r>
+              <a:rPr lang="pt-BR" dirty="0" err="1"/>
+              <a:t>commit</a:t>
+            </a:r>
             <a:r>
               <a:rPr lang="pt-BR" dirty="0"/>
-              <a:t>Criar TAG com versão de </a:t>
-            </a:r>
-            <a:r>
-              <a:rPr lang="pt-BR" dirty="0" err="1"/>
-              <a:t>comiter</a:t>
-            </a:r>
-            <a:r>
-              <a:rPr lang="pt-BR" dirty="0"/>
-              <a:t> </a:t>
-            </a:r>
-            <a:r>
-              <a:rPr lang="pt-BR" dirty="0" err="1"/>
-              <a:t>alterior</a:t>
-            </a:r>
-            <a:endParaRPr lang="pt-BR" dirty="0"/>
-          </a:p>
-          <a:p>
-            <a:pPr lvl="3"/>
+              <a:t> do projeto</a:t>
+            </a:r>
+          </a:p>
+          <a:p>
+            <a:pPr lvl="1"/>
             <a:r>
               <a:rPr lang="pt-BR" dirty="0" err="1"/>
               <a:t>Git</a:t>
             </a:r>
             <a:r>
               <a:rPr lang="pt-BR" dirty="0"/>
-              <a:t> </a:t>
-            </a:r>
-            <a:r>
-              <a:rPr lang="pt-BR" dirty="0" err="1"/>
-              <a:t>tag</a:t>
-            </a:r>
-            <a:r>
-              <a:rPr lang="pt-BR" dirty="0"/>
-              <a:t> –a V0.0 kljsdfoiiudojfmdmgd4fdgf1cv1fvgf –m “Versão 0.0”</a:t>
-            </a:r>
-          </a:p>
-          <a:p>
-            <a:pPr lvl="2"/>
-            <a:r>
-              <a:rPr lang="pt-BR" dirty="0"/>
-              <a:t>Detalhes da TAG</a:t>
-            </a:r>
-          </a:p>
-          <a:p>
-            <a:pPr lvl="3"/>
-            <a:r>
-              <a:rPr lang="pt-BR" dirty="0" err="1"/>
-              <a:t>Git</a:t>
-            </a:r>
-            <a:r>
-              <a:rPr lang="pt-BR" dirty="0"/>
-              <a:t> show V0.0</a:t>
-            </a:r>
-          </a:p>
-          <a:p>
-            <a:pPr lvl="2"/>
-            <a:r>
-              <a:rPr lang="pt-BR" dirty="0"/>
-              <a:t>Trocar versão do sistema para determinada TAG</a:t>
-            </a:r>
-          </a:p>
-          <a:p>
-            <a:pPr lvl="3"/>
-            <a:r>
-              <a:rPr lang="pt-BR" dirty="0" err="1"/>
-              <a:t>Git</a:t>
-            </a:r>
-            <a:r>
-              <a:rPr lang="pt-BR" dirty="0"/>
-              <a:t> checkout V0.0</a:t>
-            </a:r>
-          </a:p>
-          <a:p>
-            <a:pPr lvl="2"/>
-            <a:r>
-              <a:rPr lang="pt-BR" dirty="0"/>
-              <a:t>Deletar TAG</a:t>
-            </a:r>
-          </a:p>
-          <a:p>
-            <a:pPr lvl="3"/>
-            <a:r>
-              <a:rPr lang="pt-BR" dirty="0" err="1"/>
-              <a:t>Git</a:t>
-            </a:r>
-            <a:r>
-              <a:rPr lang="pt-BR" dirty="0"/>
-              <a:t> </a:t>
-            </a:r>
-            <a:r>
-              <a:rPr lang="pt-BR" dirty="0" err="1"/>
-              <a:t>tag</a:t>
-            </a:r>
-            <a:r>
-              <a:rPr lang="pt-BR" dirty="0"/>
-              <a:t> –d V0.0</a:t>
-            </a:r>
-          </a:p>
-          <a:p>
-            <a:pPr lvl="3"/>
+              <a:t> checkout bc4836</a:t>
+            </a:r>
+          </a:p>
+          <a:p>
             <a:endParaRPr lang="pt-BR" dirty="0"/>
           </a:p>
           <a:p>
@@ -13427,10 +13386,21 @@
             <a:endParaRPr lang="pt-BR" dirty="0"/>
           </a:p>
           <a:p>
+            <a:endParaRPr lang="pt-BR" u="sng" dirty="0"/>
+          </a:p>
+          <a:p>
             <a:pPr lvl="1"/>
             <a:endParaRPr lang="pt-BR" dirty="0"/>
           </a:p>
           <a:p>
+            <a:pPr lvl="1"/>
+            <a:endParaRPr lang="pt-BR" dirty="0"/>
+          </a:p>
+          <a:p>
+            <a:pPr lvl="1"/>
+            <a:endParaRPr lang="pt-BR" dirty="0"/>
+          </a:p>
+          <a:p>
             <a:endParaRPr lang="pt-BR" dirty="0"/>
           </a:p>
           <a:p>
@@ -13444,10 +13414,39 @@
           </a:p>
         </p:txBody>
       </p:sp>
+      <p:pic>
+        <p:nvPicPr>
+          <p:cNvPr id="8" name="Espaço Reservado para Conteúdo 7">
+            <a:extLst>
+              <a:ext uri="{FF2B5EF4-FFF2-40B4-BE49-F238E27FC236}">
+                <a16:creationId xmlns:a16="http://schemas.microsoft.com/office/drawing/2014/main" id="{7A840BF3-FAB6-4F96-B0C5-628AD79D968C}"/>
+              </a:ext>
+            </a:extLst>
+          </p:cNvPr>
+          <p:cNvPicPr>
+            <a:picLocks noGrp="1" noChangeAspect="1"/>
+          </p:cNvPicPr>
+          <p:nvPr>
+            <p:ph sz="quarter" idx="4"/>
+          </p:nvPr>
+        </p:nvPicPr>
+        <p:blipFill>
+          <a:blip r:embed="rId2"/>
+          <a:stretch>
+            <a:fillRect/>
+          </a:stretch>
+        </p:blipFill>
+        <p:spPr>
+          <a:xfrm>
+            <a:off x="6365511" y="1237957"/>
+            <a:ext cx="3819499" cy="3000243"/>
+          </a:xfrm>
+        </p:spPr>
+      </p:pic>
     </p:spTree>
     <p:extLst>
       <p:ext uri="{BB962C8B-B14F-4D97-AF65-F5344CB8AC3E}">
-        <p14:creationId xmlns:p14="http://schemas.microsoft.com/office/powerpoint/2010/main" val="3150264905"/>
+        <p14:creationId xmlns:p14="http://schemas.microsoft.com/office/powerpoint/2010/main" val="1834751976"/>
       </p:ext>
     </p:extLst>
   </p:cSld>
@@ -13507,17 +13506,8 @@
               <a:rPr lang="pt-BR" sz="4000" dirty="0">
                 <a:latin typeface="Britannic Bold" panose="020B0903060703020204" pitchFamily="34" charset="0"/>
               </a:rPr>
-              <a:t>Teste local - </a:t>
-            </a:r>
-            <a:r>
-              <a:rPr lang="pt-BR" sz="4000" dirty="0" err="1">
-                <a:latin typeface="Britannic Bold" panose="020B0903060703020204" pitchFamily="34" charset="0"/>
-              </a:rPr>
-              <a:t>branch</a:t>
-            </a:r>
-            <a:endParaRPr lang="pt-BR" sz="4000" dirty="0">
-              <a:latin typeface="Britannic Bold" panose="020B0903060703020204" pitchFamily="34" charset="0"/>
-            </a:endParaRPr>
+              <a:t>Teste local - TAG</a:t>
+            </a:r>
           </a:p>
         </p:txBody>
       </p:sp>
@@ -13551,153 +13541,159 @@
           <a:p>
             <a:pPr lvl="1"/>
             <a:r>
-              <a:rPr lang="pt-BR" sz="2800" dirty="0"/>
-              <a:t>BRANCH</a:t>
+              <a:rPr lang="pt-BR" dirty="0"/>
+              <a:t>TAG</a:t>
             </a:r>
           </a:p>
           <a:p>
             <a:pPr lvl="2"/>
             <a:r>
-              <a:rPr lang="pt-BR" sz="2400" dirty="0"/>
-              <a:t>Criar</a:t>
+              <a:rPr lang="pt-BR" dirty="0"/>
+              <a:t>Listar	</a:t>
             </a:r>
           </a:p>
           <a:p>
             <a:pPr lvl="3"/>
             <a:r>
-              <a:rPr lang="pt-BR" sz="2000" dirty="0" err="1"/>
+              <a:rPr lang="pt-BR" dirty="0" err="1"/>
               <a:t>Git</a:t>
             </a:r>
             <a:r>
-              <a:rPr lang="pt-BR" sz="2000" dirty="0"/>
+              <a:rPr lang="pt-BR" dirty="0"/>
               <a:t> </a:t>
             </a:r>
             <a:r>
-              <a:rPr lang="pt-BR" sz="2000" dirty="0" err="1"/>
-              <a:t>branch</a:t>
-            </a:r>
-            <a:r>
-              <a:rPr lang="pt-BR" sz="2000" dirty="0"/>
-              <a:t> teste</a:t>
-            </a:r>
+              <a:rPr lang="pt-BR" dirty="0" err="1"/>
+              <a:t>tag</a:t>
+            </a:r>
+            <a:endParaRPr lang="pt-BR" dirty="0"/>
           </a:p>
           <a:p>
             <a:pPr lvl="2"/>
             <a:r>
-              <a:rPr lang="pt-BR" sz="2400" dirty="0"/>
-              <a:t>Muda da </a:t>
-            </a:r>
-            <a:r>
-              <a:rPr lang="pt-BR" sz="2400" dirty="0" err="1"/>
-              <a:t>branch</a:t>
-            </a:r>
-            <a:r>
-              <a:rPr lang="pt-BR" sz="2400" dirty="0"/>
-              <a:t> atual para a teste</a:t>
+              <a:rPr lang="pt-BR" dirty="0"/>
+              <a:t>Adicionar</a:t>
             </a:r>
           </a:p>
           <a:p>
             <a:pPr lvl="3"/>
             <a:r>
-              <a:rPr lang="pt-BR" sz="2000" dirty="0" err="1"/>
+              <a:rPr lang="pt-BR" dirty="0" err="1"/>
               <a:t>Git</a:t>
             </a:r>
             <a:r>
-              <a:rPr lang="pt-BR" sz="2000" dirty="0"/>
-              <a:t> checkout teste</a:t>
+              <a:rPr lang="pt-BR" dirty="0"/>
+              <a:t> </a:t>
+            </a:r>
+            <a:r>
+              <a:rPr lang="pt-BR" dirty="0" err="1"/>
+              <a:t>tag</a:t>
+            </a:r>
+            <a:r>
+              <a:rPr lang="pt-BR" dirty="0"/>
+              <a:t> –a V1.0 –m “Versão 1.0”</a:t>
             </a:r>
           </a:p>
           <a:p>
             <a:pPr lvl="2"/>
             <a:r>
-              <a:rPr lang="pt-BR" sz="2400" dirty="0"/>
-              <a:t>Cria a </a:t>
-            </a:r>
-            <a:r>
-              <a:rPr lang="pt-BR" sz="2400" dirty="0" err="1"/>
-              <a:t>branch</a:t>
-            </a:r>
-            <a:r>
-              <a:rPr lang="pt-BR" sz="2400" dirty="0"/>
-              <a:t> e já vai para ela</a:t>
-            </a:r>
+              <a:rPr lang="pt-BR" dirty="0"/>
+              <a:t>Criar TAG com versão de </a:t>
+            </a:r>
+            <a:r>
+              <a:rPr lang="pt-BR" dirty="0" err="1"/>
+              <a:t>comiter</a:t>
+            </a:r>
+            <a:r>
+              <a:rPr lang="pt-BR" dirty="0"/>
+              <a:t> </a:t>
+            </a:r>
+            <a:r>
+              <a:rPr lang="pt-BR" dirty="0" err="1"/>
+              <a:t>alterior</a:t>
+            </a:r>
+            <a:endParaRPr lang="pt-BR" dirty="0"/>
           </a:p>
           <a:p>
             <a:pPr lvl="3"/>
             <a:r>
-              <a:rPr lang="pt-BR" sz="2000" dirty="0" err="1"/>
+              <a:rPr lang="pt-BR" dirty="0" err="1"/>
               <a:t>Git</a:t>
             </a:r>
             <a:r>
-              <a:rPr lang="pt-BR" sz="2000" dirty="0"/>
+              <a:rPr lang="pt-BR" dirty="0"/>
               <a:t> </a:t>
             </a:r>
             <a:r>
-              <a:rPr lang="pt-BR" sz="2000" dirty="0" err="1"/>
-              <a:t>branch</a:t>
-            </a:r>
-            <a:r>
-              <a:rPr lang="pt-BR" sz="2000" dirty="0"/>
-              <a:t> –b teste2</a:t>
+              <a:rPr lang="pt-BR" dirty="0" err="1"/>
+              <a:t>tag</a:t>
+            </a:r>
+            <a:r>
+              <a:rPr lang="pt-BR" dirty="0"/>
+              <a:t> –a V0.0 kljsdfoiiudojfmdmgd4fdgf1cv1fvgf –m “Versão 0.0”</a:t>
             </a:r>
           </a:p>
           <a:p>
             <a:pPr lvl="2"/>
             <a:r>
-              <a:rPr lang="pt-BR" sz="2200" dirty="0"/>
-              <a:t>Listar todas as </a:t>
-            </a:r>
-            <a:r>
-              <a:rPr lang="pt-BR" sz="2200" dirty="0" err="1"/>
-              <a:t>branchs</a:t>
-            </a:r>
-            <a:endParaRPr lang="pt-BR" sz="2200" dirty="0"/>
+              <a:rPr lang="pt-BR" dirty="0"/>
+              <a:t>Detalhes da TAG</a:t>
+            </a:r>
           </a:p>
           <a:p>
             <a:pPr lvl="3"/>
             <a:r>
-              <a:rPr lang="pt-BR" sz="2000" dirty="0" err="1"/>
+              <a:rPr lang="pt-BR" dirty="0" err="1"/>
               <a:t>Git</a:t>
             </a:r>
             <a:r>
-              <a:rPr lang="pt-BR" sz="2000" dirty="0"/>
+              <a:rPr lang="pt-BR" dirty="0"/>
+              <a:t> show V0.0</a:t>
+            </a:r>
+          </a:p>
+          <a:p>
+            <a:pPr lvl="2"/>
+            <a:r>
+              <a:rPr lang="pt-BR" dirty="0"/>
+              <a:t>Trocar versão do sistema para determinada TAG</a:t>
+            </a:r>
+          </a:p>
+          <a:p>
+            <a:pPr lvl="3"/>
+            <a:r>
+              <a:rPr lang="pt-BR" dirty="0" err="1"/>
+              <a:t>Git</a:t>
+            </a:r>
+            <a:r>
+              <a:rPr lang="pt-BR" dirty="0"/>
+              <a:t> checkout V0.0</a:t>
+            </a:r>
+          </a:p>
+          <a:p>
+            <a:pPr lvl="2"/>
+            <a:r>
+              <a:rPr lang="pt-BR" dirty="0"/>
+              <a:t>Deletar TAG</a:t>
+            </a:r>
+          </a:p>
+          <a:p>
+            <a:pPr lvl="3"/>
+            <a:r>
+              <a:rPr lang="pt-BR" dirty="0" err="1"/>
+              <a:t>Git</a:t>
+            </a:r>
+            <a:r>
+              <a:rPr lang="pt-BR" dirty="0"/>
               <a:t> </a:t>
             </a:r>
             <a:r>
-              <a:rPr lang="pt-BR" sz="2000" dirty="0" err="1"/>
-              <a:t>branch</a:t>
-            </a:r>
-            <a:endParaRPr lang="pt-BR" sz="2000" dirty="0"/>
-          </a:p>
-          <a:p>
-            <a:pPr lvl="2"/>
-            <a:r>
-              <a:rPr lang="pt-BR" sz="2200" dirty="0"/>
-              <a:t>Deletar</a:t>
-            </a:r>
-          </a:p>
-          <a:p>
-            <a:pPr lvl="3"/>
-            <a:r>
-              <a:rPr lang="pt-BR" sz="2000" dirty="0" err="1"/>
-              <a:t>Git</a:t>
-            </a:r>
-            <a:r>
-              <a:rPr lang="pt-BR" sz="2000" dirty="0"/>
-              <a:t> </a:t>
-            </a:r>
-            <a:r>
-              <a:rPr lang="pt-BR" sz="2000" dirty="0" err="1"/>
-              <a:t>branch</a:t>
-            </a:r>
-            <a:r>
-              <a:rPr lang="pt-BR" sz="2000" dirty="0"/>
-              <a:t> –d teste</a:t>
-            </a:r>
-          </a:p>
-          <a:p>
-            <a:pPr lvl="2"/>
-            <a:endParaRPr lang="pt-BR" sz="2400" dirty="0"/>
+              <a:rPr lang="pt-BR" dirty="0" err="1"/>
+              <a:t>tag</a:t>
+            </a:r>
+            <a:r>
+              <a:rPr lang="pt-BR" dirty="0"/>
+              <a:t> –d V0.0</a:t>
+            </a:r>
           </a:p>
           <a:p>
             <a:pPr lvl="3"/>
@@ -13728,7 +13724,7 @@
     </p:spTree>
     <p:extLst>
       <p:ext uri="{BB962C8B-B14F-4D97-AF65-F5344CB8AC3E}">
-        <p14:creationId xmlns:p14="http://schemas.microsoft.com/office/powerpoint/2010/main" val="462994896"/>
+        <p14:creationId xmlns:p14="http://schemas.microsoft.com/office/powerpoint/2010/main" val="3150264905"/>
       </p:ext>
     </p:extLst>
   </p:cSld>
@@ -13788,8 +13784,17 @@
               <a:rPr lang="pt-BR" sz="4000" dirty="0">
                 <a:latin typeface="Britannic Bold" panose="020B0903060703020204" pitchFamily="34" charset="0"/>
               </a:rPr>
-              <a:t>Teste local - merge</a:t>
-            </a:r>
+              <a:t>Teste local - </a:t>
+            </a:r>
+            <a:r>
+              <a:rPr lang="pt-BR" sz="4000" dirty="0" err="1">
+                <a:latin typeface="Britannic Bold" panose="020B0903060703020204" pitchFamily="34" charset="0"/>
+              </a:rPr>
+              <a:t>branch</a:t>
+            </a:r>
+            <a:endParaRPr lang="pt-BR" sz="4000" dirty="0">
+              <a:latin typeface="Britannic Bold" panose="020B0903060703020204" pitchFamily="34" charset="0"/>
+            </a:endParaRPr>
           </a:p>
         </p:txBody>
       </p:sp>
@@ -13824,14 +13829,40 @@
             <a:pPr lvl="1"/>
             <a:r>
               <a:rPr lang="pt-BR" sz="2800" dirty="0"/>
-              <a:t>MERGE</a:t>
+              <a:t>BRANCH</a:t>
             </a:r>
           </a:p>
           <a:p>
             <a:pPr lvl="2"/>
             <a:r>
               <a:rPr lang="pt-BR" sz="2400" dirty="0"/>
-              <a:t>Tem que está na </a:t>
+              <a:t>Criar</a:t>
+            </a:r>
+          </a:p>
+          <a:p>
+            <a:pPr lvl="3"/>
+            <a:r>
+              <a:rPr lang="pt-BR" sz="2000" dirty="0" err="1"/>
+              <a:t>Git</a:t>
+            </a:r>
+            <a:r>
+              <a:rPr lang="pt-BR" sz="2000" dirty="0"/>
+              <a:t> </a:t>
+            </a:r>
+            <a:r>
+              <a:rPr lang="pt-BR" sz="2000" dirty="0" err="1"/>
+              <a:t>branch</a:t>
+            </a:r>
+            <a:r>
+              <a:rPr lang="pt-BR" sz="2000" dirty="0"/>
+              <a:t> teste</a:t>
+            </a:r>
+          </a:p>
+          <a:p>
+            <a:pPr lvl="2"/>
+            <a:r>
+              <a:rPr lang="pt-BR" sz="2400" dirty="0"/>
+              <a:t>Muda da </a:t>
             </a:r>
             <a:r>
               <a:rPr lang="pt-BR" sz="2400" dirty="0" err="1"/>
@@ -13839,44 +13870,44 @@
             </a:r>
             <a:r>
               <a:rPr lang="pt-BR" sz="2400" dirty="0"/>
-              <a:t> que irá receber as modificações de outra </a:t>
+              <a:t> atual para a teste</a:t>
+            </a:r>
+          </a:p>
+          <a:p>
+            <a:pPr lvl="3"/>
+            <a:r>
+              <a:rPr lang="pt-BR" sz="2000" dirty="0" err="1"/>
+              <a:t>Git</a:t>
+            </a:r>
+            <a:r>
+              <a:rPr lang="pt-BR" sz="2000" dirty="0"/>
+              <a:t> checkout teste</a:t>
+            </a:r>
+          </a:p>
+          <a:p>
+            <a:pPr lvl="2"/>
+            <a:r>
+              <a:rPr lang="pt-BR" sz="2400" dirty="0"/>
+              <a:t>Cria a </a:t>
             </a:r>
             <a:r>
               <a:rPr lang="pt-BR" sz="2400" dirty="0" err="1"/>
               <a:t>branch</a:t>
             </a:r>
-            <a:endParaRPr lang="pt-BR" sz="2400" dirty="0"/>
-          </a:p>
-          <a:p>
-            <a:pPr lvl="2"/>
+            <a:r>
+              <a:rPr lang="pt-BR" sz="2400" dirty="0"/>
+              <a:t> e já vai para ela</a:t>
+            </a:r>
+          </a:p>
+          <a:p>
+            <a:pPr lvl="3"/>
+            <a:r>
+              <a:rPr lang="pt-BR" sz="2000" dirty="0" err="1"/>
+              <a:t>Git</a:t>
+            </a:r>
             <a:r>
               <a:rPr lang="pt-BR" sz="2000" dirty="0"/>
-              <a:t>Exemplo</a:t>
-            </a:r>
-          </a:p>
-          <a:p>
-            <a:pPr lvl="3"/>
-            <a:r>
-              <a:rPr lang="pt-BR" sz="1800" dirty="0"/>
-              <a:t>Ir para a master, dentro da master digitar:</a:t>
-            </a:r>
-          </a:p>
-          <a:p>
-            <a:pPr lvl="4"/>
-            <a:r>
-              <a:rPr lang="pt-BR" sz="1800" dirty="0" err="1"/>
-              <a:t>Git</a:t>
-            </a:r>
-            <a:r>
-              <a:rPr lang="pt-BR" sz="1800" dirty="0"/>
-              <a:t> merge teste</a:t>
-            </a:r>
-          </a:p>
-          <a:p>
-            <a:pPr lvl="2"/>
-            <a:r>
-              <a:rPr lang="pt-BR" sz="2000" dirty="0"/>
-              <a:t>Quando existir conflitos, tipo: criou uma função A que recebe 2 parâmetros na </a:t>
+              <a:t> </a:t>
             </a:r>
             <a:r>
               <a:rPr lang="pt-BR" sz="2000" dirty="0" err="1"/>
@@ -13884,46 +13915,62 @@
             </a:r>
             <a:r>
               <a:rPr lang="pt-BR" sz="2000" dirty="0"/>
-              <a:t> teste, voltou para a master e alterou a função A para receber 1 parâmetro.</a:t>
-            </a:r>
+              <a:t> –b teste2</a:t>
+            </a:r>
+          </a:p>
+          <a:p>
+            <a:pPr lvl="2"/>
+            <a:r>
+              <a:rPr lang="pt-BR" sz="2200" dirty="0"/>
+              <a:t>Listar todas as </a:t>
+            </a:r>
+            <a:r>
+              <a:rPr lang="pt-BR" sz="2200" dirty="0" err="1"/>
+              <a:t>branchs</a:t>
+            </a:r>
+            <a:endParaRPr lang="pt-BR" sz="2200" dirty="0"/>
           </a:p>
           <a:p>
             <a:pPr lvl="3"/>
             <a:r>
-              <a:rPr lang="pt-BR" sz="1800" dirty="0" err="1"/>
+              <a:rPr lang="pt-BR" sz="2000" dirty="0" err="1"/>
               <a:t>Git</a:t>
             </a:r>
             <a:r>
-              <a:rPr lang="pt-BR" sz="1800" dirty="0"/>
-              <a:t> merge teste</a:t>
-            </a:r>
-          </a:p>
-          <a:p>
-            <a:pPr lvl="4"/>
-            <a:r>
-              <a:rPr lang="pt-BR" sz="1800" dirty="0"/>
-              <a:t>Aparecerá com conflito</a:t>
-            </a:r>
-          </a:p>
-          <a:p>
-            <a:pPr lvl="4"/>
-            <a:r>
-              <a:rPr lang="pt-BR" sz="1800" dirty="0"/>
-              <a:t>Corrija na sua IDE, escolha qual deve fica e depois ADD e </a:t>
-            </a:r>
-            <a:r>
-              <a:rPr lang="pt-BR" sz="1800" dirty="0" err="1"/>
-              <a:t>Comitar</a:t>
-            </a:r>
-            <a:endParaRPr lang="pt-BR" sz="1800" dirty="0"/>
-          </a:p>
-          <a:p>
-            <a:pPr lvl="4"/>
-            <a:endParaRPr lang="pt-BR" sz="1800" dirty="0"/>
+              <a:rPr lang="pt-BR" sz="2000" dirty="0"/>
+              <a:t> </a:t>
+            </a:r>
+            <a:r>
+              <a:rPr lang="pt-BR" sz="2000" dirty="0" err="1"/>
+              <a:t>branch</a:t>
+            </a:r>
+            <a:endParaRPr lang="pt-BR" sz="2000" dirty="0"/>
+          </a:p>
+          <a:p>
+            <a:pPr lvl="2"/>
+            <a:r>
+              <a:rPr lang="pt-BR" sz="2200" dirty="0"/>
+              <a:t>Deletar</a:t>
+            </a:r>
           </a:p>
           <a:p>
             <a:pPr lvl="3"/>
-            <a:endParaRPr lang="pt-BR" sz="1800" dirty="0"/>
+            <a:r>
+              <a:rPr lang="pt-BR" sz="2000" dirty="0" err="1"/>
+              <a:t>Git</a:t>
+            </a:r>
+            <a:r>
+              <a:rPr lang="pt-BR" sz="2000" dirty="0"/>
+              <a:t> </a:t>
+            </a:r>
+            <a:r>
+              <a:rPr lang="pt-BR" sz="2000" dirty="0" err="1"/>
+              <a:t>branch</a:t>
+            </a:r>
+            <a:r>
+              <a:rPr lang="pt-BR" sz="2000" dirty="0"/>
+              <a:t> –d teste</a:t>
+            </a:r>
           </a:p>
           <a:p>
             <a:pPr lvl="2"/>
@@ -13958,7 +14005,7 @@
     </p:spTree>
     <p:extLst>
       <p:ext uri="{BB962C8B-B14F-4D97-AF65-F5344CB8AC3E}">
-        <p14:creationId xmlns:p14="http://schemas.microsoft.com/office/powerpoint/2010/main" val="2258034651"/>
+        <p14:creationId xmlns:p14="http://schemas.microsoft.com/office/powerpoint/2010/main" val="462994896"/>
       </p:ext>
     </p:extLst>
   </p:cSld>
@@ -14018,17 +14065,8 @@
               <a:rPr lang="pt-BR" sz="4000" dirty="0">
                 <a:latin typeface="Britannic Bold" panose="020B0903060703020204" pitchFamily="34" charset="0"/>
               </a:rPr>
-              <a:t>Teste remoto - </a:t>
-            </a:r>
-            <a:r>
-              <a:rPr lang="pt-BR" sz="4000" dirty="0" err="1">
-                <a:latin typeface="Britannic Bold" panose="020B0903060703020204" pitchFamily="34" charset="0"/>
-              </a:rPr>
-              <a:t>CLone</a:t>
-            </a:r>
-            <a:endParaRPr lang="pt-BR" sz="4000" dirty="0">
-              <a:latin typeface="Britannic Bold" panose="020B0903060703020204" pitchFamily="34" charset="0"/>
-            </a:endParaRPr>
+              <a:t>Teste local - merge</a:t>
+            </a:r>
           </a:p>
         </p:txBody>
       </p:sp>
@@ -14062,59 +14100,99 @@
           <a:p>
             <a:pPr lvl="1"/>
             <a:r>
-              <a:rPr lang="pt-BR" sz="3200" dirty="0"/>
-              <a:t>CLONE</a:t>
+              <a:rPr lang="pt-BR" sz="2800" dirty="0"/>
+              <a:t>MERGE</a:t>
             </a:r>
           </a:p>
           <a:p>
             <a:pPr lvl="2"/>
             <a:r>
+              <a:rPr lang="pt-BR" sz="2400" dirty="0"/>
+              <a:t>Tem que está na </a:t>
+            </a:r>
+            <a:r>
+              <a:rPr lang="pt-BR" sz="2400" dirty="0" err="1"/>
+              <a:t>branch</a:t>
+            </a:r>
+            <a:r>
+              <a:rPr lang="pt-BR" sz="2400" dirty="0"/>
+              <a:t> que irá receber as modificações de outra </a:t>
+            </a:r>
+            <a:r>
+              <a:rPr lang="pt-BR" sz="2400" dirty="0" err="1"/>
+              <a:t>branch</a:t>
+            </a:r>
+            <a:endParaRPr lang="pt-BR" sz="2400" dirty="0"/>
+          </a:p>
+          <a:p>
+            <a:pPr lvl="2"/>
+            <a:r>
+              <a:rPr lang="pt-BR" sz="2000" dirty="0"/>
+              <a:t>Exemplo</a:t>
+            </a:r>
+          </a:p>
+          <a:p>
+            <a:pPr lvl="3"/>
+            <a:r>
+              <a:rPr lang="pt-BR" sz="1800" dirty="0"/>
+              <a:t>Ir para a master, dentro da master digitar:</a:t>
+            </a:r>
+          </a:p>
+          <a:p>
+            <a:pPr lvl="4"/>
+            <a:r>
+              <a:rPr lang="pt-BR" sz="1800" dirty="0" err="1"/>
+              <a:t>Git</a:t>
+            </a:r>
+            <a:r>
+              <a:rPr lang="pt-BR" sz="1800" dirty="0"/>
+              <a:t> merge teste</a:t>
+            </a:r>
+          </a:p>
+          <a:p>
+            <a:pPr lvl="2"/>
+            <a:r>
+              <a:rPr lang="pt-BR" sz="2000" dirty="0"/>
+              <a:t>Quando existir conflitos, tipo: criou uma função A que recebe 2 parâmetros na </a:t>
+            </a:r>
+            <a:r>
               <a:rPr lang="pt-BR" sz="2000" dirty="0" err="1"/>
+              <a:t>branch</a:t>
+            </a:r>
+            <a:r>
+              <a:rPr lang="pt-BR" sz="2000" dirty="0"/>
+              <a:t> teste, voltou para a master e alterou a função A para receber 1 parâmetro.</a:t>
+            </a:r>
+          </a:p>
+          <a:p>
+            <a:pPr lvl="3"/>
+            <a:r>
+              <a:rPr lang="pt-BR" sz="1800" dirty="0" err="1"/>
               <a:t>Git</a:t>
             </a:r>
             <a:r>
-              <a:rPr lang="pt-BR" sz="2000" dirty="0"/>
-              <a:t> clone </a:t>
-            </a:r>
-            <a:r>
-              <a:rPr lang="pt-BR" sz="2000" dirty="0" err="1"/>
-              <a:t>endereco</a:t>
-            </a:r>
-            <a:r>
-              <a:rPr lang="pt-BR" sz="2000" dirty="0"/>
-              <a:t>-projeto</a:t>
-            </a:r>
-          </a:p>
-          <a:p>
-            <a:pPr lvl="2"/>
-            <a:r>
-              <a:rPr lang="pt-BR" sz="2000" dirty="0" err="1"/>
-              <a:t>Git</a:t>
-            </a:r>
-            <a:r>
-              <a:rPr lang="pt-BR" sz="2000" dirty="0"/>
-              <a:t> clone </a:t>
-            </a:r>
-            <a:r>
-              <a:rPr lang="pt-BR" sz="2000" dirty="0" err="1"/>
-              <a:t>endereco</a:t>
-            </a:r>
-            <a:r>
-              <a:rPr lang="pt-BR" sz="2000" dirty="0"/>
-              <a:t>-projeto nome-pasta</a:t>
-            </a:r>
-          </a:p>
-          <a:p>
-            <a:pPr lvl="2"/>
-            <a:endParaRPr lang="pt-BR" sz="1600" dirty="0"/>
-          </a:p>
-          <a:p>
-            <a:pPr lvl="2"/>
-            <a:endParaRPr lang="pt-BR" sz="1600" dirty="0"/>
-          </a:p>
-          <a:p>
-            <a:pPr lvl="2"/>
-            <a:endParaRPr lang="pt-BR" sz="1600" dirty="0"/>
+              <a:rPr lang="pt-BR" sz="1800" dirty="0"/>
+              <a:t> merge teste</a:t>
+            </a:r>
+          </a:p>
+          <a:p>
+            <a:pPr lvl="4"/>
+            <a:r>
+              <a:rPr lang="pt-BR" sz="1800" dirty="0"/>
+              <a:t>Aparecerá com conflito</a:t>
+            </a:r>
+          </a:p>
+          <a:p>
+            <a:pPr lvl="4"/>
+            <a:r>
+              <a:rPr lang="pt-BR" sz="1800" dirty="0"/>
+              <a:t>Corrija na sua IDE, escolha qual deve fica e depois ADD e </a:t>
+            </a:r>
+            <a:r>
+              <a:rPr lang="pt-BR" sz="1800" dirty="0" err="1"/>
+              <a:t>Comitar</a:t>
+            </a:r>
+            <a:endParaRPr lang="pt-BR" sz="1800" dirty="0"/>
           </a:p>
           <a:p>
             <a:pPr lvl="4"/>
@@ -14157,7 +14235,7 @@
     </p:spTree>
     <p:extLst>
       <p:ext uri="{BB962C8B-B14F-4D97-AF65-F5344CB8AC3E}">
-        <p14:creationId xmlns:p14="http://schemas.microsoft.com/office/powerpoint/2010/main" val="723468295"/>
+        <p14:creationId xmlns:p14="http://schemas.microsoft.com/office/powerpoint/2010/main" val="2258034651"/>
       </p:ext>
     </p:extLst>
   </p:cSld>
@@ -14217,25 +14295,13 @@
               <a:rPr lang="pt-BR" sz="4000" dirty="0">
                 <a:latin typeface="Britannic Bold" panose="020B0903060703020204" pitchFamily="34" charset="0"/>
               </a:rPr>
-              <a:t>Teste remoto – </a:t>
+              <a:t>Teste remoto - </a:t>
             </a:r>
             <a:r>
               <a:rPr lang="pt-BR" sz="4000" dirty="0" err="1">
                 <a:latin typeface="Britannic Bold" panose="020B0903060703020204" pitchFamily="34" charset="0"/>
               </a:rPr>
-              <a:t>push</a:t>
-            </a:r>
-            <a:r>
-              <a:rPr lang="pt-BR" sz="4000" dirty="0">
-                <a:latin typeface="Britannic Bold" panose="020B0903060703020204" pitchFamily="34" charset="0"/>
-              </a:rPr>
-              <a:t> – PULL - </a:t>
-            </a:r>
-            <a:r>
-              <a:rPr lang="pt-BR" sz="4000" dirty="0" err="1">
-                <a:latin typeface="Britannic Bold" panose="020B0903060703020204" pitchFamily="34" charset="0"/>
-              </a:rPr>
-              <a:t>fetch</a:t>
+              <a:t>CLone</a:t>
             </a:r>
             <a:endParaRPr lang="pt-BR" sz="4000" dirty="0">
               <a:latin typeface="Britannic Bold" panose="020B0903060703020204" pitchFamily="34" charset="0"/>
@@ -14273,173 +14339,93 @@
           <a:p>
             <a:pPr lvl="1"/>
             <a:r>
-              <a:rPr lang="pt-BR" sz="3600" dirty="0"/>
-              <a:t>PUSH</a:t>
+              <a:rPr lang="pt-BR" sz="3200" dirty="0"/>
+              <a:t>Lista repositório remoto</a:t>
             </a:r>
           </a:p>
           <a:p>
             <a:pPr lvl="2"/>
             <a:r>
+              <a:rPr lang="pt-BR" sz="2000" dirty="0" err="1"/>
+              <a:t>Git</a:t>
+            </a:r>
+            <a:r>
               <a:rPr lang="pt-BR" sz="2000" dirty="0"/>
-              <a:t>Lista os diretórios remotos</a:t>
-            </a:r>
-          </a:p>
-          <a:p>
-            <a:pPr lvl="3"/>
-            <a:r>
-              <a:rPr lang="pt-BR" sz="1800" dirty="0" err="1"/>
+              <a:t> </a:t>
+            </a:r>
+            <a:r>
+              <a:rPr lang="pt-BR" sz="2000" dirty="0" err="1"/>
+              <a:t>remote</a:t>
+            </a:r>
+            <a:endParaRPr lang="pt-BR" sz="2000" dirty="0"/>
+          </a:p>
+          <a:p>
+            <a:pPr lvl="2"/>
+            <a:r>
+              <a:rPr lang="pt-BR" sz="2000" dirty="0" err="1"/>
               <a:t>Git</a:t>
             </a:r>
             <a:r>
-              <a:rPr lang="pt-BR" sz="1800" dirty="0"/>
-              <a:t> remoto</a:t>
+              <a:rPr lang="pt-BR" sz="2000" dirty="0"/>
+              <a:t> </a:t>
+            </a:r>
+            <a:r>
+              <a:rPr lang="pt-BR" sz="2000" dirty="0" err="1"/>
+              <a:t>remote</a:t>
+            </a:r>
+            <a:r>
+              <a:rPr lang="pt-BR" sz="2000"/>
+              <a:t> -</a:t>
+            </a:r>
+            <a:r>
+              <a:rPr lang="pt-BR" sz="2000" dirty="0"/>
+              <a:t>v</a:t>
+            </a:r>
+          </a:p>
+          <a:p>
+            <a:pPr lvl="1"/>
+            <a:r>
+              <a:rPr lang="pt-BR" sz="3200" dirty="0"/>
+              <a:t>Clone</a:t>
             </a:r>
           </a:p>
           <a:p>
             <a:pPr lvl="2"/>
             <a:r>
+              <a:rPr lang="pt-BR" sz="2000" dirty="0" err="1"/>
+              <a:t>Git</a:t>
+            </a:r>
+            <a:r>
               <a:rPr lang="pt-BR" sz="2000" dirty="0"/>
-              <a:t>Enviar para o servidor</a:t>
-            </a:r>
-          </a:p>
-          <a:p>
-            <a:pPr lvl="3"/>
-            <a:r>
-              <a:rPr lang="pt-BR" sz="1800" dirty="0" err="1"/>
+              <a:t> clone </a:t>
+            </a:r>
+            <a:r>
+              <a:rPr lang="pt-BR" sz="2000" dirty="0" err="1"/>
+              <a:t>endereco</a:t>
+            </a:r>
+            <a:r>
+              <a:rPr lang="pt-BR" sz="2000" dirty="0"/>
+              <a:t>-projeto</a:t>
+            </a:r>
+          </a:p>
+          <a:p>
+            <a:pPr lvl="2"/>
+            <a:r>
+              <a:rPr lang="pt-BR" sz="2000" dirty="0" err="1"/>
               <a:t>Git</a:t>
             </a:r>
             <a:r>
-              <a:rPr lang="pt-BR" sz="1800" dirty="0"/>
-              <a:t> </a:t>
-            </a:r>
-            <a:r>
-              <a:rPr lang="pt-BR" sz="1800" dirty="0" err="1"/>
-              <a:t>push</a:t>
-            </a:r>
-            <a:r>
-              <a:rPr lang="pt-BR" sz="1800" dirty="0"/>
-              <a:t> </a:t>
-            </a:r>
-            <a:r>
-              <a:rPr lang="pt-BR" sz="1800" dirty="0" err="1"/>
-              <a:t>origin</a:t>
-            </a:r>
-            <a:r>
-              <a:rPr lang="pt-BR" sz="1800" dirty="0"/>
-              <a:t> </a:t>
-            </a:r>
-            <a:r>
-              <a:rPr lang="pt-BR" sz="1800" dirty="0" err="1"/>
-              <a:t>main</a:t>
-            </a:r>
-            <a:endParaRPr lang="pt-BR" sz="1800" dirty="0"/>
-          </a:p>
-          <a:p>
-            <a:pPr lvl="1"/>
-            <a:r>
-              <a:rPr lang="pt-BR" sz="3600" dirty="0"/>
-              <a:t>PULL</a:t>
-            </a:r>
-          </a:p>
-          <a:p>
-            <a:pPr lvl="2"/>
-            <a:r>
               <a:rPr lang="pt-BR" sz="2000" dirty="0"/>
-              <a:t> Pega do servidor</a:t>
-            </a:r>
-          </a:p>
-          <a:p>
-            <a:pPr lvl="3"/>
-            <a:r>
-              <a:rPr lang="pt-BR" sz="1800" dirty="0" err="1"/>
-              <a:t>Git</a:t>
-            </a:r>
-            <a:r>
-              <a:rPr lang="pt-BR" sz="1800" dirty="0"/>
-              <a:t> </a:t>
-            </a:r>
-            <a:r>
-              <a:rPr lang="pt-BR" sz="1800" dirty="0" err="1"/>
-              <a:t>pull</a:t>
-            </a:r>
-            <a:r>
-              <a:rPr lang="pt-BR" sz="1800" dirty="0"/>
-              <a:t> </a:t>
-            </a:r>
-            <a:r>
-              <a:rPr lang="pt-BR" sz="1800" dirty="0" err="1"/>
-              <a:t>origin</a:t>
-            </a:r>
-            <a:r>
-              <a:rPr lang="pt-BR" sz="1800" dirty="0"/>
-              <a:t> </a:t>
-            </a:r>
-            <a:r>
-              <a:rPr lang="pt-BR" sz="1800" dirty="0" err="1"/>
-              <a:t>main</a:t>
-            </a:r>
-            <a:endParaRPr lang="pt-BR" sz="1800" dirty="0"/>
-          </a:p>
-          <a:p>
-            <a:pPr lvl="1"/>
-            <a:r>
-              <a:rPr lang="pt-BR" sz="3600" dirty="0"/>
-              <a:t>FETCH</a:t>
-            </a:r>
-          </a:p>
-          <a:p>
-            <a:pPr lvl="2"/>
+              <a:t> clone </a:t>
+            </a:r>
+            <a:r>
+              <a:rPr lang="pt-BR" sz="2000" dirty="0" err="1"/>
+              <a:t>endereco</a:t>
+            </a:r>
             <a:r>
               <a:rPr lang="pt-BR" sz="2000" dirty="0"/>
-              <a:t>Pega as alterações do servidor e coloca em uma </a:t>
-            </a:r>
-            <a:r>
-              <a:rPr lang="pt-BR" sz="2000" dirty="0" err="1"/>
-              <a:t>branch</a:t>
-            </a:r>
-            <a:r>
-              <a:rPr lang="pt-BR" sz="2000" dirty="0"/>
-              <a:t> separado </a:t>
-            </a:r>
-          </a:p>
-          <a:p>
-            <a:pPr lvl="3"/>
-            <a:r>
-              <a:rPr lang="pt-BR" sz="1800" dirty="0" err="1"/>
-              <a:t>Git</a:t>
-            </a:r>
-            <a:r>
-              <a:rPr lang="pt-BR" sz="1800" dirty="0"/>
-              <a:t> </a:t>
-            </a:r>
-            <a:r>
-              <a:rPr lang="pt-BR" sz="1800" dirty="0" err="1"/>
-              <a:t>fetch</a:t>
-            </a:r>
-            <a:r>
-              <a:rPr lang="pt-BR" sz="1800" dirty="0"/>
-              <a:t> </a:t>
-            </a:r>
-            <a:r>
-              <a:rPr lang="pt-BR" sz="1800" dirty="0" err="1"/>
-              <a:t>origin</a:t>
-            </a:r>
-            <a:r>
-              <a:rPr lang="pt-BR" sz="1800" dirty="0"/>
-              <a:t> </a:t>
-            </a:r>
-            <a:r>
-              <a:rPr lang="pt-BR" sz="1800" dirty="0" err="1"/>
-              <a:t>branch</a:t>
-            </a:r>
-            <a:r>
-              <a:rPr lang="pt-BR" sz="1800" dirty="0"/>
-              <a:t> teste</a:t>
-            </a:r>
-          </a:p>
-          <a:p>
-            <a:pPr lvl="3"/>
-            <a:endParaRPr lang="pt-BR" sz="1800" dirty="0"/>
+              <a:t>-projeto nome-pasta</a:t>
+            </a:r>
           </a:p>
           <a:p>
             <a:pPr lvl="2"/>
@@ -14494,7 +14480,7 @@
     </p:spTree>
     <p:extLst>
       <p:ext uri="{BB962C8B-B14F-4D97-AF65-F5344CB8AC3E}">
-        <p14:creationId xmlns:p14="http://schemas.microsoft.com/office/powerpoint/2010/main" val="2848501237"/>
+        <p14:creationId xmlns:p14="http://schemas.microsoft.com/office/powerpoint/2010/main" val="723468295"/>
       </p:ext>
     </p:extLst>
   </p:cSld>
@@ -14554,6 +14540,343 @@
               <a:rPr lang="pt-BR" sz="4000" dirty="0">
                 <a:latin typeface="Britannic Bold" panose="020B0903060703020204" pitchFamily="34" charset="0"/>
               </a:rPr>
+              <a:t>Teste remoto – </a:t>
+            </a:r>
+            <a:r>
+              <a:rPr lang="pt-BR" sz="4000" dirty="0" err="1">
+                <a:latin typeface="Britannic Bold" panose="020B0903060703020204" pitchFamily="34" charset="0"/>
+              </a:rPr>
+              <a:t>push</a:t>
+            </a:r>
+            <a:r>
+              <a:rPr lang="pt-BR" sz="4000" dirty="0">
+                <a:latin typeface="Britannic Bold" panose="020B0903060703020204" pitchFamily="34" charset="0"/>
+              </a:rPr>
+              <a:t> – PULL - </a:t>
+            </a:r>
+            <a:r>
+              <a:rPr lang="pt-BR" sz="4000" dirty="0" err="1">
+                <a:latin typeface="Britannic Bold" panose="020B0903060703020204" pitchFamily="34" charset="0"/>
+              </a:rPr>
+              <a:t>fetch</a:t>
+            </a:r>
+            <a:endParaRPr lang="pt-BR" sz="4000" dirty="0">
+              <a:latin typeface="Britannic Bold" panose="020B0903060703020204" pitchFamily="34" charset="0"/>
+            </a:endParaRPr>
+          </a:p>
+        </p:txBody>
+      </p:sp>
+      <p:sp>
+        <p:nvSpPr>
+          <p:cNvPr id="3" name="Espaço Reservado para Conteúdo 2">
+            <a:extLst>
+              <a:ext uri="{FF2B5EF4-FFF2-40B4-BE49-F238E27FC236}">
+                <a16:creationId xmlns:a16="http://schemas.microsoft.com/office/drawing/2014/main" id="{5C259CD8-3AFB-4778-ABD8-DE0445F456E5}"/>
+              </a:ext>
+            </a:extLst>
+          </p:cNvPr>
+          <p:cNvSpPr>
+            <a:spLocks noGrp="1"/>
+          </p:cNvSpPr>
+          <p:nvPr>
+            <p:ph idx="1"/>
+          </p:nvPr>
+        </p:nvSpPr>
+        <p:spPr>
+          <a:xfrm>
+            <a:off x="1141412" y="1223890"/>
+            <a:ext cx="9905999" cy="5528602"/>
+          </a:xfrm>
+        </p:spPr>
+        <p:txBody>
+          <a:bodyPr>
+            <a:normAutofit/>
+          </a:bodyPr>
+          <a:lstStyle/>
+          <a:p>
+            <a:pPr lvl="1"/>
+            <a:r>
+              <a:rPr lang="pt-BR" sz="3600" dirty="0"/>
+              <a:t>PUSH</a:t>
+            </a:r>
+          </a:p>
+          <a:p>
+            <a:pPr lvl="2"/>
+            <a:r>
+              <a:rPr lang="pt-BR" sz="2000" dirty="0"/>
+              <a:t>Lista os diretórios remotos</a:t>
+            </a:r>
+          </a:p>
+          <a:p>
+            <a:pPr lvl="3"/>
+            <a:r>
+              <a:rPr lang="pt-BR" sz="1800" dirty="0" err="1"/>
+              <a:t>Git</a:t>
+            </a:r>
+            <a:r>
+              <a:rPr lang="pt-BR" sz="1800" dirty="0"/>
+              <a:t> remoto</a:t>
+            </a:r>
+          </a:p>
+          <a:p>
+            <a:pPr lvl="2"/>
+            <a:r>
+              <a:rPr lang="pt-BR" sz="2000" dirty="0"/>
+              <a:t>Enviar para o servidor</a:t>
+            </a:r>
+          </a:p>
+          <a:p>
+            <a:pPr lvl="3"/>
+            <a:r>
+              <a:rPr lang="pt-BR" sz="1800" dirty="0" err="1"/>
+              <a:t>Git</a:t>
+            </a:r>
+            <a:r>
+              <a:rPr lang="pt-BR" sz="1800" dirty="0"/>
+              <a:t> </a:t>
+            </a:r>
+            <a:r>
+              <a:rPr lang="pt-BR" sz="1800" dirty="0" err="1"/>
+              <a:t>push</a:t>
+            </a:r>
+            <a:r>
+              <a:rPr lang="pt-BR" sz="1800" dirty="0"/>
+              <a:t> </a:t>
+            </a:r>
+            <a:r>
+              <a:rPr lang="pt-BR" sz="1800" dirty="0" err="1"/>
+              <a:t>origin</a:t>
+            </a:r>
+            <a:r>
+              <a:rPr lang="pt-BR" sz="1800" dirty="0"/>
+              <a:t> </a:t>
+            </a:r>
+            <a:r>
+              <a:rPr lang="pt-BR" sz="1800" dirty="0" err="1"/>
+              <a:t>main</a:t>
+            </a:r>
+            <a:endParaRPr lang="pt-BR" sz="1800" dirty="0"/>
+          </a:p>
+          <a:p>
+            <a:pPr lvl="1"/>
+            <a:r>
+              <a:rPr lang="pt-BR" sz="3600" dirty="0"/>
+              <a:t>PULL</a:t>
+            </a:r>
+          </a:p>
+          <a:p>
+            <a:pPr lvl="2"/>
+            <a:r>
+              <a:rPr lang="pt-BR" sz="2000" dirty="0"/>
+              <a:t> Pega do servidor</a:t>
+            </a:r>
+          </a:p>
+          <a:p>
+            <a:pPr lvl="3"/>
+            <a:r>
+              <a:rPr lang="pt-BR" sz="1800" dirty="0" err="1"/>
+              <a:t>Git</a:t>
+            </a:r>
+            <a:r>
+              <a:rPr lang="pt-BR" sz="1800" dirty="0"/>
+              <a:t> </a:t>
+            </a:r>
+            <a:r>
+              <a:rPr lang="pt-BR" sz="1800" dirty="0" err="1"/>
+              <a:t>pull</a:t>
+            </a:r>
+            <a:r>
+              <a:rPr lang="pt-BR" sz="1800" dirty="0"/>
+              <a:t> </a:t>
+            </a:r>
+            <a:r>
+              <a:rPr lang="pt-BR" sz="1800" dirty="0" err="1"/>
+              <a:t>origin</a:t>
+            </a:r>
+            <a:r>
+              <a:rPr lang="pt-BR" sz="1800" dirty="0"/>
+              <a:t> </a:t>
+            </a:r>
+            <a:r>
+              <a:rPr lang="pt-BR" sz="1800" dirty="0" err="1"/>
+              <a:t>main</a:t>
+            </a:r>
+            <a:endParaRPr lang="pt-BR" sz="1800" dirty="0"/>
+          </a:p>
+          <a:p>
+            <a:pPr lvl="1"/>
+            <a:r>
+              <a:rPr lang="pt-BR" sz="3600" dirty="0"/>
+              <a:t>FETCH</a:t>
+            </a:r>
+          </a:p>
+          <a:p>
+            <a:pPr lvl="2"/>
+            <a:r>
+              <a:rPr lang="pt-BR" sz="2000" dirty="0"/>
+              <a:t>Pega as alterações do servidor e coloca em uma </a:t>
+            </a:r>
+            <a:r>
+              <a:rPr lang="pt-BR" sz="2000" dirty="0" err="1"/>
+              <a:t>branch</a:t>
+            </a:r>
+            <a:r>
+              <a:rPr lang="pt-BR" sz="2000" dirty="0"/>
+              <a:t> separado </a:t>
+            </a:r>
+          </a:p>
+          <a:p>
+            <a:pPr lvl="3"/>
+            <a:r>
+              <a:rPr lang="pt-BR" sz="1800" dirty="0" err="1"/>
+              <a:t>Git</a:t>
+            </a:r>
+            <a:r>
+              <a:rPr lang="pt-BR" sz="1800" dirty="0"/>
+              <a:t> </a:t>
+            </a:r>
+            <a:r>
+              <a:rPr lang="pt-BR" sz="1800" dirty="0" err="1"/>
+              <a:t>fetch</a:t>
+            </a:r>
+            <a:r>
+              <a:rPr lang="pt-BR" sz="1800" dirty="0"/>
+              <a:t> </a:t>
+            </a:r>
+            <a:r>
+              <a:rPr lang="pt-BR" sz="1800" dirty="0" err="1"/>
+              <a:t>origin</a:t>
+            </a:r>
+            <a:r>
+              <a:rPr lang="pt-BR" sz="1800" dirty="0"/>
+              <a:t> </a:t>
+            </a:r>
+            <a:r>
+              <a:rPr lang="pt-BR" sz="1800" dirty="0" err="1"/>
+              <a:t>branch</a:t>
+            </a:r>
+            <a:r>
+              <a:rPr lang="pt-BR" sz="1800" dirty="0"/>
+              <a:t> teste</a:t>
+            </a:r>
+          </a:p>
+          <a:p>
+            <a:pPr lvl="3"/>
+            <a:endParaRPr lang="pt-BR" sz="1800" dirty="0"/>
+          </a:p>
+          <a:p>
+            <a:pPr lvl="2"/>
+            <a:endParaRPr lang="pt-BR" sz="1600" dirty="0"/>
+          </a:p>
+          <a:p>
+            <a:pPr lvl="2"/>
+            <a:endParaRPr lang="pt-BR" sz="1600" dirty="0"/>
+          </a:p>
+          <a:p>
+            <a:pPr lvl="2"/>
+            <a:endParaRPr lang="pt-BR" sz="1600" dirty="0"/>
+          </a:p>
+          <a:p>
+            <a:pPr lvl="4"/>
+            <a:endParaRPr lang="pt-BR" sz="1800" dirty="0"/>
+          </a:p>
+          <a:p>
+            <a:pPr lvl="3"/>
+            <a:endParaRPr lang="pt-BR" sz="1800" dirty="0"/>
+          </a:p>
+          <a:p>
+            <a:pPr lvl="2"/>
+            <a:endParaRPr lang="pt-BR" sz="2400" dirty="0"/>
+          </a:p>
+          <a:p>
+            <a:pPr lvl="3"/>
+            <a:endParaRPr lang="pt-BR" dirty="0"/>
+          </a:p>
+          <a:p>
+            <a:pPr lvl="1"/>
+            <a:endParaRPr lang="pt-BR" dirty="0"/>
+          </a:p>
+          <a:p>
+            <a:pPr lvl="1"/>
+            <a:endParaRPr lang="pt-BR" dirty="0"/>
+          </a:p>
+          <a:p>
+            <a:endParaRPr lang="pt-BR" dirty="0"/>
+          </a:p>
+          <a:p>
+            <a:endParaRPr lang="pt-BR" dirty="0"/>
+          </a:p>
+          <a:p>
+            <a:pPr marL="457200" lvl="1" indent="0">
+              <a:buNone/>
+            </a:pPr>
+            <a:endParaRPr lang="pt-BR" dirty="0"/>
+          </a:p>
+        </p:txBody>
+      </p:sp>
+    </p:spTree>
+    <p:extLst>
+      <p:ext uri="{BB962C8B-B14F-4D97-AF65-F5344CB8AC3E}">
+        <p14:creationId xmlns:p14="http://schemas.microsoft.com/office/powerpoint/2010/main" val="2848501237"/>
+      </p:ext>
+    </p:extLst>
+  </p:cSld>
+  <p:clrMapOvr>
+    <a:masterClrMapping/>
+  </p:clrMapOvr>
+</p:sld>
+</file>
+
+<file path=ppt/slides/slide18.xml><?xml version="1.0" encoding="utf-8"?>
+<p:sld xmlns:a="http://schemas.openxmlformats.org/drawingml/2006/main" xmlns:r="http://schemas.openxmlformats.org/officeDocument/2006/relationships" xmlns:p="http://schemas.openxmlformats.org/presentationml/2006/main">
+  <p:cSld>
+    <p:spTree>
+      <p:nvGrpSpPr>
+        <p:cNvPr id="1" name=""/>
+        <p:cNvGrpSpPr/>
+        <p:nvPr/>
+      </p:nvGrpSpPr>
+      <p:grpSpPr>
+        <a:xfrm>
+          <a:off x="0" y="0"/>
+          <a:ext cx="0" cy="0"/>
+          <a:chOff x="0" y="0"/>
+          <a:chExt cx="0" cy="0"/>
+        </a:xfrm>
+      </p:grpSpPr>
+      <p:sp>
+        <p:nvSpPr>
+          <p:cNvPr id="2" name="Título 1">
+            <a:extLst>
+              <a:ext uri="{FF2B5EF4-FFF2-40B4-BE49-F238E27FC236}">
+                <a16:creationId xmlns:a16="http://schemas.microsoft.com/office/drawing/2014/main" id="{0B59645C-EDBB-4769-B247-18170C80E709}"/>
+              </a:ext>
+            </a:extLst>
+          </p:cNvPr>
+          <p:cNvSpPr>
+            <a:spLocks noGrp="1"/>
+          </p:cNvSpPr>
+          <p:nvPr>
+            <p:ph type="title"/>
+          </p:nvPr>
+        </p:nvSpPr>
+        <p:spPr>
+          <a:xfrm>
+            <a:off x="1141413" y="105509"/>
+            <a:ext cx="9905998" cy="1478570"/>
+          </a:xfrm>
+        </p:spPr>
+        <p:txBody>
+          <a:bodyPr>
+            <a:normAutofit/>
+          </a:bodyPr>
+          <a:lstStyle/>
+          <a:p>
+            <a:pPr algn="ctr"/>
+            <a:r>
+              <a:rPr lang="pt-BR" sz="4000" dirty="0">
+                <a:latin typeface="Britannic Bold" panose="020B0903060703020204" pitchFamily="34" charset="0"/>
+              </a:rPr>
               <a:t>GIT COM GITHUB</a:t>
             </a:r>
           </a:p>
@@ -14793,7 +15116,7 @@
 </p:sld>
 </file>
 
-<file path=ppt/slides/slide18.xml><?xml version="1.0" encoding="utf-8"?>
+<file path=ppt/slides/slide19.xml><?xml version="1.0" encoding="utf-8"?>
 <p:sld xmlns:a="http://schemas.openxmlformats.org/drawingml/2006/main" xmlns:r="http://schemas.openxmlformats.org/officeDocument/2006/relationships" xmlns:p="http://schemas.openxmlformats.org/presentationml/2006/main">
   <p:cSld>
     <p:spTree>
@@ -16520,6 +16843,23 @@
             <a:r>
               <a:rPr lang="pt-BR" dirty="0"/>
               <a:t> *</a:t>
+            </a:r>
+          </a:p>
+          <a:p>
+            <a:r>
+              <a:rPr lang="pt-BR" dirty="0"/>
+              <a:t>Informações dos arquivos</a:t>
+            </a:r>
+          </a:p>
+          <a:p>
+            <a:pPr lvl="1"/>
+            <a:r>
+              <a:rPr lang="pt-BR" dirty="0" err="1"/>
+              <a:t>Git</a:t>
+            </a:r>
+            <a:r>
+              <a:rPr lang="pt-BR" dirty="0"/>
+              <a:t> status</a:t>
             </a:r>
           </a:p>
           <a:p>

</xml_diff>